<commit_message>
More JPA slides. Plans for the next few days.
</commit_message>
<xml_diff>
--- a/files/databases.pptx
+++ b/files/databases.pptx
@@ -5,7 +5,7 @@
     <p:sldMasterId id="2147483672" r:id="rId1"/>
   </p:sldMasterIdLst>
   <p:notesMasterIdLst>
-    <p:notesMasterId r:id="rId26"/>
+    <p:notesMasterId r:id="rId40"/>
   </p:notesMasterIdLst>
   <p:sldIdLst>
     <p:sldId id="256" r:id="rId2"/>
@@ -32,6 +32,20 @@
     <p:sldId id="280" r:id="rId23"/>
     <p:sldId id="281" r:id="rId24"/>
     <p:sldId id="282" r:id="rId25"/>
+    <p:sldId id="283" r:id="rId26"/>
+    <p:sldId id="284" r:id="rId27"/>
+    <p:sldId id="285" r:id="rId28"/>
+    <p:sldId id="286" r:id="rId29"/>
+    <p:sldId id="287" r:id="rId30"/>
+    <p:sldId id="289" r:id="rId31"/>
+    <p:sldId id="295" r:id="rId32"/>
+    <p:sldId id="292" r:id="rId33"/>
+    <p:sldId id="288" r:id="rId34"/>
+    <p:sldId id="293" r:id="rId35"/>
+    <p:sldId id="291" r:id="rId36"/>
+    <p:sldId id="294" r:id="rId37"/>
+    <p:sldId id="290" r:id="rId38"/>
+    <p:sldId id="296" r:id="rId39"/>
   </p:sldIdLst>
   <p:sldSz cx="12192000" cy="6858000"/>
   <p:notesSz cx="6858000" cy="9144000"/>
@@ -131,6 +145,76 @@
     </a:lvl9pPr>
   </p:defaultTextStyle>
   <p:extLst>
+    <p:ext uri="{521415D9-36F7-43E2-AB2F-B90AF26B5E84}">
+      <p14:sectionLst xmlns:p14="http://schemas.microsoft.com/office/powerpoint/2010/main">
+        <p14:section name="Introduction" id="{724E95C6-983F-49B9-A283-BFA9CEB81EAD}">
+          <p14:sldIdLst>
+            <p14:sldId id="256"/>
+            <p14:sldId id="273"/>
+            <p14:sldId id="258"/>
+            <p14:sldId id="259"/>
+          </p14:sldIdLst>
+        </p14:section>
+        <p14:section name="H2" id="{81DC501F-0826-476F-962C-663892E880B8}">
+          <p14:sldIdLst>
+            <p14:sldId id="267"/>
+            <p14:sldId id="260"/>
+            <p14:sldId id="262"/>
+            <p14:sldId id="263"/>
+            <p14:sldId id="264"/>
+            <p14:sldId id="276"/>
+            <p14:sldId id="268"/>
+            <p14:sldId id="261"/>
+            <p14:sldId id="265"/>
+            <p14:sldId id="270"/>
+            <p14:sldId id="271"/>
+            <p14:sldId id="275"/>
+          </p14:sldIdLst>
+        </p14:section>
+        <p14:section name="JDBC" id="{BE5B45D0-3702-4E31-B263-B3C075399414}">
+          <p14:sldIdLst>
+            <p14:sldId id="269"/>
+            <p14:sldId id="272"/>
+            <p14:sldId id="277"/>
+            <p14:sldId id="278"/>
+            <p14:sldId id="279"/>
+            <p14:sldId id="280"/>
+            <p14:sldId id="281"/>
+            <p14:sldId id="282"/>
+          </p14:sldIdLst>
+        </p14:section>
+        <p14:section name="JPA" id="{D31E70F4-593D-423D-931E-6DA215A67DBD}">
+          <p14:sldIdLst>
+            <p14:sldId id="283"/>
+            <p14:sldId id="284"/>
+            <p14:sldId id="285"/>
+            <p14:sldId id="286"/>
+            <p14:sldId id="287"/>
+            <p14:sldId id="289"/>
+            <p14:sldId id="295"/>
+          </p14:sldIdLst>
+        </p14:section>
+        <p14:section name="Repositories" id="{ED37F317-76DC-41A6-A340-93DB0B4F42F8}">
+          <p14:sldIdLst>
+            <p14:sldId id="292"/>
+            <p14:sldId id="288"/>
+            <p14:sldId id="293"/>
+            <p14:sldId id="291"/>
+            <p14:sldId id="294"/>
+          </p14:sldIdLst>
+        </p14:section>
+        <p14:section name="Debugging" id="{EAB4380E-E99D-4658-AEA2-7F7B28759A9C}">
+          <p14:sldIdLst>
+            <p14:sldId id="290"/>
+          </p14:sldIdLst>
+        </p14:section>
+        <p14:section name="JPA Summary" id="{9FBA1240-4B10-4B33-91CD-7A4A2720FAFE}">
+          <p14:sldIdLst>
+            <p14:sldId id="296"/>
+          </p14:sldIdLst>
+        </p14:section>
+      </p14:sectionLst>
+    </p:ext>
     <p:ext uri="{EFAFB233-063F-42B5-8137-9DF3F51BA10A}">
       <p15:sldGuideLst xmlns:p15="http://schemas.microsoft.com/office/powerpoint/2012/main"/>
     </p:ext>
@@ -220,7 +304,7 @@
           <a:p>
             <a:fld id="{AE9313CA-BDDA-44A7-9E0E-1B3B2C06E86C}" type="datetimeFigureOut">
               <a:rPr lang="en-US" smtClean="0"/>
-              <a:t>2/11/2020</a:t>
+              <a:t>2/17/2020</a:t>
             </a:fld>
             <a:endParaRPr lang="en-US"/>
           </a:p>
@@ -1069,6 +1153,101 @@
 </p:notes>
 </file>
 
+<file path=ppt/notesSlides/notesSlide6.xml><?xml version="1.0" encoding="utf-8"?>
+<p:notes xmlns:a="http://schemas.openxmlformats.org/drawingml/2006/main" xmlns:r="http://schemas.openxmlformats.org/officeDocument/2006/relationships" xmlns:p="http://schemas.openxmlformats.org/presentationml/2006/main">
+  <p:cSld>
+    <p:spTree>
+      <p:nvGrpSpPr>
+        <p:cNvPr id="1" name=""/>
+        <p:cNvGrpSpPr/>
+        <p:nvPr/>
+      </p:nvGrpSpPr>
+      <p:grpSpPr>
+        <a:xfrm>
+          <a:off x="0" y="0"/>
+          <a:ext cx="0" cy="0"/>
+          <a:chOff x="0" y="0"/>
+          <a:chExt cx="0" cy="0"/>
+        </a:xfrm>
+      </p:grpSpPr>
+      <p:sp>
+        <p:nvSpPr>
+          <p:cNvPr id="2" name="Slide Image Placeholder 1"/>
+          <p:cNvSpPr>
+            <a:spLocks noGrp="1" noRot="1" noChangeAspect="1"/>
+          </p:cNvSpPr>
+          <p:nvPr>
+            <p:ph type="sldImg"/>
+          </p:nvPr>
+        </p:nvSpPr>
+        <p:spPr/>
+      </p:sp>
+      <p:sp>
+        <p:nvSpPr>
+          <p:cNvPr id="3" name="Notes Placeholder 2"/>
+          <p:cNvSpPr>
+            <a:spLocks noGrp="1"/>
+          </p:cNvSpPr>
+          <p:nvPr>
+            <p:ph type="body" idx="1"/>
+          </p:nvPr>
+        </p:nvSpPr>
+        <p:spPr/>
+        <p:txBody>
+          <a:bodyPr/>
+          <a:lstStyle/>
+          <a:p>
+            <a:pPr marL="0" indent="0">
+              <a:buFont typeface="Arial" panose="020B0604020202020204" pitchFamily="34" charset="0"/>
+              <a:buNone/>
+            </a:pPr>
+            <a:endParaRPr lang="en-US" sz="1200" kern="1200" dirty="0">
+              <a:solidFill>
+                <a:schemeClr val="tx1"/>
+              </a:solidFill>
+              <a:latin typeface="+mn-lt"/>
+              <a:ea typeface="+mn-ea"/>
+              <a:cs typeface="+mn-cs"/>
+            </a:endParaRPr>
+          </a:p>
+        </p:txBody>
+      </p:sp>
+      <p:sp>
+        <p:nvSpPr>
+          <p:cNvPr id="4" name="Slide Number Placeholder 3"/>
+          <p:cNvSpPr>
+            <a:spLocks noGrp="1"/>
+          </p:cNvSpPr>
+          <p:nvPr>
+            <p:ph type="sldNum" sz="quarter" idx="5"/>
+          </p:nvPr>
+        </p:nvSpPr>
+        <p:spPr/>
+        <p:txBody>
+          <a:bodyPr/>
+          <a:lstStyle/>
+          <a:p>
+            <a:fld id="{717684DD-E6C4-431E-8944-24331FC299D6}" type="slidenum">
+              <a:rPr lang="en-US" smtClean="0"/>
+              <a:t>32</a:t>
+            </a:fld>
+            <a:endParaRPr lang="en-US"/>
+          </a:p>
+        </p:txBody>
+      </p:sp>
+    </p:spTree>
+    <p:extLst>
+      <p:ext uri="{BB962C8B-B14F-4D97-AF65-F5344CB8AC3E}">
+        <p14:creationId xmlns:p14="http://schemas.microsoft.com/office/powerpoint/2010/main" val="628654368"/>
+      </p:ext>
+    </p:extLst>
+  </p:cSld>
+  <p:clrMapOvr>
+    <a:masterClrMapping/>
+  </p:clrMapOvr>
+</p:notes>
+</file>
+
 <file path=ppt/slideLayouts/slideLayout1.xml><?xml version="1.0" encoding="utf-8"?>
 <p:sldLayout xmlns:a="http://schemas.openxmlformats.org/drawingml/2006/main" xmlns:r="http://schemas.openxmlformats.org/officeDocument/2006/relationships" xmlns:p="http://schemas.openxmlformats.org/presentationml/2006/main" type="title" preserve="1">
   <p:cSld name="Title Slide">
@@ -1216,7 +1395,7 @@
           <a:p>
             <a:fld id="{D8539D00-AE5B-46A6-ADC3-4198439BF718}" type="datetimeFigureOut">
               <a:rPr lang="en-US" smtClean="0"/>
-              <a:t>2/11/2020</a:t>
+              <a:t>2/17/2020</a:t>
             </a:fld>
             <a:endParaRPr lang="en-US"/>
           </a:p>
@@ -1414,7 +1593,7 @@
           <a:p>
             <a:fld id="{D8539D00-AE5B-46A6-ADC3-4198439BF718}" type="datetimeFigureOut">
               <a:rPr lang="en-US" smtClean="0"/>
-              <a:t>2/11/2020</a:t>
+              <a:t>2/17/2020</a:t>
             </a:fld>
             <a:endParaRPr lang="en-US"/>
           </a:p>
@@ -1622,7 +1801,7 @@
           <a:p>
             <a:fld id="{D8539D00-AE5B-46A6-ADC3-4198439BF718}" type="datetimeFigureOut">
               <a:rPr lang="en-US" smtClean="0"/>
-              <a:t>2/11/2020</a:t>
+              <a:t>2/17/2020</a:t>
             </a:fld>
             <a:endParaRPr lang="en-US"/>
           </a:p>
@@ -1820,7 +1999,7 @@
           <a:p>
             <a:fld id="{D8539D00-AE5B-46A6-ADC3-4198439BF718}" type="datetimeFigureOut">
               <a:rPr lang="en-US" smtClean="0"/>
-              <a:t>2/11/2020</a:t>
+              <a:t>2/17/2020</a:t>
             </a:fld>
             <a:endParaRPr lang="en-US"/>
           </a:p>
@@ -2095,7 +2274,7 @@
           <a:p>
             <a:fld id="{D8539D00-AE5B-46A6-ADC3-4198439BF718}" type="datetimeFigureOut">
               <a:rPr lang="en-US" smtClean="0"/>
-              <a:t>2/11/2020</a:t>
+              <a:t>2/17/2020</a:t>
             </a:fld>
             <a:endParaRPr lang="en-US"/>
           </a:p>
@@ -2360,7 +2539,7 @@
           <a:p>
             <a:fld id="{D8539D00-AE5B-46A6-ADC3-4198439BF718}" type="datetimeFigureOut">
               <a:rPr lang="en-US" smtClean="0"/>
-              <a:t>2/11/2020</a:t>
+              <a:t>2/17/2020</a:t>
             </a:fld>
             <a:endParaRPr lang="en-US"/>
           </a:p>
@@ -2772,7 +2951,7 @@
           <a:p>
             <a:fld id="{D8539D00-AE5B-46A6-ADC3-4198439BF718}" type="datetimeFigureOut">
               <a:rPr lang="en-US" smtClean="0"/>
-              <a:t>2/11/2020</a:t>
+              <a:t>2/17/2020</a:t>
             </a:fld>
             <a:endParaRPr lang="en-US"/>
           </a:p>
@@ -2913,7 +3092,7 @@
           <a:p>
             <a:fld id="{D8539D00-AE5B-46A6-ADC3-4198439BF718}" type="datetimeFigureOut">
               <a:rPr lang="en-US" smtClean="0"/>
-              <a:t>2/11/2020</a:t>
+              <a:t>2/17/2020</a:t>
             </a:fld>
             <a:endParaRPr lang="en-US"/>
           </a:p>
@@ -3026,7 +3205,7 @@
           <a:p>
             <a:fld id="{D8539D00-AE5B-46A6-ADC3-4198439BF718}" type="datetimeFigureOut">
               <a:rPr lang="en-US" smtClean="0"/>
-              <a:t>2/11/2020</a:t>
+              <a:t>2/17/2020</a:t>
             </a:fld>
             <a:endParaRPr lang="en-US"/>
           </a:p>
@@ -3337,7 +3516,7 @@
           <a:p>
             <a:fld id="{D8539D00-AE5B-46A6-ADC3-4198439BF718}" type="datetimeFigureOut">
               <a:rPr lang="en-US" smtClean="0"/>
-              <a:t>2/11/2020</a:t>
+              <a:t>2/17/2020</a:t>
             </a:fld>
             <a:endParaRPr lang="en-US"/>
           </a:p>
@@ -3625,7 +3804,7 @@
           <a:p>
             <a:fld id="{D8539D00-AE5B-46A6-ADC3-4198439BF718}" type="datetimeFigureOut">
               <a:rPr lang="en-US" smtClean="0"/>
-              <a:t>2/11/2020</a:t>
+              <a:t>2/17/2020</a:t>
             </a:fld>
             <a:endParaRPr lang="en-US"/>
           </a:p>
@@ -3866,7 +4045,7 @@
           <a:p>
             <a:fld id="{D8539D00-AE5B-46A6-ADC3-4198439BF718}" type="datetimeFigureOut">
               <a:rPr lang="en-US" smtClean="0"/>
-              <a:t>2/11/2020</a:t>
+              <a:t>2/17/2020</a:t>
             </a:fld>
             <a:endParaRPr lang="en-US"/>
           </a:p>
@@ -11231,6 +11410,474 @@
 </p:sld>
 </file>
 
+<file path=ppt/slides/slide25.xml><?xml version="1.0" encoding="utf-8"?>
+<p:sld xmlns:a="http://schemas.openxmlformats.org/drawingml/2006/main" xmlns:r="http://schemas.openxmlformats.org/officeDocument/2006/relationships" xmlns:p="http://schemas.openxmlformats.org/presentationml/2006/main">
+  <p:cSld>
+    <p:spTree>
+      <p:nvGrpSpPr>
+        <p:cNvPr id="1" name=""/>
+        <p:cNvGrpSpPr/>
+        <p:nvPr/>
+      </p:nvGrpSpPr>
+      <p:grpSpPr>
+        <a:xfrm>
+          <a:off x="0" y="0"/>
+          <a:ext cx="0" cy="0"/>
+          <a:chOff x="0" y="0"/>
+          <a:chExt cx="0" cy="0"/>
+        </a:xfrm>
+      </p:grpSpPr>
+      <p:sp>
+        <p:nvSpPr>
+          <p:cNvPr id="2" name="Title 1">
+            <a:extLst>
+              <a:ext uri="{FF2B5EF4-FFF2-40B4-BE49-F238E27FC236}">
+                <a16:creationId xmlns:a16="http://schemas.microsoft.com/office/drawing/2014/main" id="{729972B4-CA77-49E8-9C39-4AC677EF3532}"/>
+              </a:ext>
+            </a:extLst>
+          </p:cNvPr>
+          <p:cNvSpPr>
+            <a:spLocks noGrp="1"/>
+          </p:cNvSpPr>
+          <p:nvPr>
+            <p:ph type="title"/>
+          </p:nvPr>
+        </p:nvSpPr>
+        <p:spPr/>
+        <p:txBody>
+          <a:bodyPr/>
+          <a:lstStyle/>
+          <a:p>
+            <a:r>
+              <a:rPr lang="en-US" dirty="0"/>
+              <a:t>Using JPA</a:t>
+            </a:r>
+          </a:p>
+        </p:txBody>
+      </p:sp>
+      <p:sp>
+        <p:nvSpPr>
+          <p:cNvPr id="3" name="Content Placeholder 2">
+            <a:extLst>
+              <a:ext uri="{FF2B5EF4-FFF2-40B4-BE49-F238E27FC236}">
+                <a16:creationId xmlns:a16="http://schemas.microsoft.com/office/drawing/2014/main" id="{8A34B4DF-17D4-48E3-957C-81BEC2066ED8}"/>
+              </a:ext>
+            </a:extLst>
+          </p:cNvPr>
+          <p:cNvSpPr>
+            <a:spLocks noGrp="1"/>
+          </p:cNvSpPr>
+          <p:nvPr>
+            <p:ph idx="1"/>
+          </p:nvPr>
+        </p:nvSpPr>
+        <p:spPr/>
+        <p:txBody>
+          <a:bodyPr/>
+          <a:lstStyle/>
+          <a:p>
+            <a:r>
+              <a:rPr lang="en-US" dirty="0"/>
+              <a:t>Relies heavily on annotations</a:t>
+            </a:r>
+          </a:p>
+          <a:p>
+            <a:r>
+              <a:rPr lang="en-US" dirty="0"/>
+              <a:t>Generates most of your SQL for you</a:t>
+            </a:r>
+          </a:p>
+          <a:p>
+            <a:r>
+              <a:rPr lang="en-US" dirty="0"/>
+              <a:t>Maps Java objects to database tables</a:t>
+            </a:r>
+          </a:p>
+        </p:txBody>
+      </p:sp>
+    </p:spTree>
+    <p:extLst>
+      <p:ext uri="{BB962C8B-B14F-4D97-AF65-F5344CB8AC3E}">
+        <p14:creationId xmlns:p14="http://schemas.microsoft.com/office/powerpoint/2010/main" val="225398063"/>
+      </p:ext>
+    </p:extLst>
+  </p:cSld>
+  <p:clrMapOvr>
+    <a:masterClrMapping/>
+  </p:clrMapOvr>
+</p:sld>
+</file>
+
+<file path=ppt/slides/slide26.xml><?xml version="1.0" encoding="utf-8"?>
+<p:sld xmlns:a="http://schemas.openxmlformats.org/drawingml/2006/main" xmlns:r="http://schemas.openxmlformats.org/officeDocument/2006/relationships" xmlns:p="http://schemas.openxmlformats.org/presentationml/2006/main">
+  <p:cSld>
+    <p:spTree>
+      <p:nvGrpSpPr>
+        <p:cNvPr id="1" name=""/>
+        <p:cNvGrpSpPr/>
+        <p:nvPr/>
+      </p:nvGrpSpPr>
+      <p:grpSpPr>
+        <a:xfrm>
+          <a:off x="0" y="0"/>
+          <a:ext cx="0" cy="0"/>
+          <a:chOff x="0" y="0"/>
+          <a:chExt cx="0" cy="0"/>
+        </a:xfrm>
+      </p:grpSpPr>
+      <p:sp>
+        <p:nvSpPr>
+          <p:cNvPr id="2" name="Title 1">
+            <a:extLst>
+              <a:ext uri="{FF2B5EF4-FFF2-40B4-BE49-F238E27FC236}">
+                <a16:creationId xmlns:a16="http://schemas.microsoft.com/office/drawing/2014/main" id="{58734B71-458B-47A4-9E8D-5E199A4A45AD}"/>
+              </a:ext>
+            </a:extLst>
+          </p:cNvPr>
+          <p:cNvSpPr>
+            <a:spLocks noGrp="1"/>
+          </p:cNvSpPr>
+          <p:nvPr>
+            <p:ph type="title"/>
+          </p:nvPr>
+        </p:nvSpPr>
+        <p:spPr/>
+        <p:txBody>
+          <a:bodyPr/>
+          <a:lstStyle/>
+          <a:p>
+            <a:r>
+              <a:rPr lang="en-US" dirty="0"/>
+              <a:t>@Entity</a:t>
+            </a:r>
+          </a:p>
+        </p:txBody>
+      </p:sp>
+      <p:sp>
+        <p:nvSpPr>
+          <p:cNvPr id="3" name="Content Placeholder 2">
+            <a:extLst>
+              <a:ext uri="{FF2B5EF4-FFF2-40B4-BE49-F238E27FC236}">
+                <a16:creationId xmlns:a16="http://schemas.microsoft.com/office/drawing/2014/main" id="{89FAEB1C-0795-4F66-931E-D1CF4047F659}"/>
+              </a:ext>
+            </a:extLst>
+          </p:cNvPr>
+          <p:cNvSpPr>
+            <a:spLocks noGrp="1"/>
+          </p:cNvSpPr>
+          <p:nvPr>
+            <p:ph idx="1"/>
+          </p:nvPr>
+        </p:nvSpPr>
+        <p:spPr/>
+        <p:txBody>
+          <a:bodyPr/>
+          <a:lstStyle/>
+          <a:p>
+            <a:r>
+              <a:rPr lang="en-US" dirty="0"/>
+              <a:t>Identifies the object as a class to be saved to the database.</a:t>
+            </a:r>
+          </a:p>
+          <a:p>
+            <a:endParaRPr lang="en-US" dirty="0"/>
+          </a:p>
+        </p:txBody>
+      </p:sp>
+    </p:spTree>
+    <p:extLst>
+      <p:ext uri="{BB962C8B-B14F-4D97-AF65-F5344CB8AC3E}">
+        <p14:creationId xmlns:p14="http://schemas.microsoft.com/office/powerpoint/2010/main" val="360433281"/>
+      </p:ext>
+    </p:extLst>
+  </p:cSld>
+  <p:clrMapOvr>
+    <a:masterClrMapping/>
+  </p:clrMapOvr>
+</p:sld>
+</file>
+
+<file path=ppt/slides/slide27.xml><?xml version="1.0" encoding="utf-8"?>
+<p:sld xmlns:a="http://schemas.openxmlformats.org/drawingml/2006/main" xmlns:r="http://schemas.openxmlformats.org/officeDocument/2006/relationships" xmlns:p="http://schemas.openxmlformats.org/presentationml/2006/main">
+  <p:cSld>
+    <p:spTree>
+      <p:nvGrpSpPr>
+        <p:cNvPr id="1" name=""/>
+        <p:cNvGrpSpPr/>
+        <p:nvPr/>
+      </p:nvGrpSpPr>
+      <p:grpSpPr>
+        <a:xfrm>
+          <a:off x="0" y="0"/>
+          <a:ext cx="0" cy="0"/>
+          <a:chOff x="0" y="0"/>
+          <a:chExt cx="0" cy="0"/>
+        </a:xfrm>
+      </p:grpSpPr>
+      <p:sp>
+        <p:nvSpPr>
+          <p:cNvPr id="2" name="Title 1">
+            <a:extLst>
+              <a:ext uri="{FF2B5EF4-FFF2-40B4-BE49-F238E27FC236}">
+                <a16:creationId xmlns:a16="http://schemas.microsoft.com/office/drawing/2014/main" id="{A94FD0B5-07EE-4652-9642-3A999A3E76FA}"/>
+              </a:ext>
+            </a:extLst>
+          </p:cNvPr>
+          <p:cNvSpPr>
+            <a:spLocks noGrp="1"/>
+          </p:cNvSpPr>
+          <p:nvPr>
+            <p:ph type="title"/>
+          </p:nvPr>
+        </p:nvSpPr>
+        <p:spPr/>
+        <p:txBody>
+          <a:bodyPr/>
+          <a:lstStyle/>
+          <a:p>
+            <a:r>
+              <a:rPr lang="en-US" dirty="0"/>
+              <a:t>@Id</a:t>
+            </a:r>
+          </a:p>
+        </p:txBody>
+      </p:sp>
+      <p:sp>
+        <p:nvSpPr>
+          <p:cNvPr id="3" name="Content Placeholder 2">
+            <a:extLst>
+              <a:ext uri="{FF2B5EF4-FFF2-40B4-BE49-F238E27FC236}">
+                <a16:creationId xmlns:a16="http://schemas.microsoft.com/office/drawing/2014/main" id="{81533712-C2D0-48D3-8EA7-5A72C2859766}"/>
+              </a:ext>
+            </a:extLst>
+          </p:cNvPr>
+          <p:cNvSpPr>
+            <a:spLocks noGrp="1"/>
+          </p:cNvSpPr>
+          <p:nvPr>
+            <p:ph idx="1"/>
+          </p:nvPr>
+        </p:nvSpPr>
+        <p:spPr/>
+        <p:txBody>
+          <a:bodyPr/>
+          <a:lstStyle/>
+          <a:p>
+            <a:r>
+              <a:rPr lang="en-US" dirty="0"/>
+              <a:t>Annotates the property that uniquely identifies the object</a:t>
+            </a:r>
+          </a:p>
+          <a:p>
+            <a:r>
+              <a:rPr lang="en-US" dirty="0"/>
+              <a:t>Becomes the primary key in the table generated for the class.</a:t>
+            </a:r>
+          </a:p>
+          <a:p>
+            <a:endParaRPr lang="en-US" dirty="0"/>
+          </a:p>
+          <a:p>
+            <a:endParaRPr lang="en-US" dirty="0"/>
+          </a:p>
+        </p:txBody>
+      </p:sp>
+    </p:spTree>
+    <p:extLst>
+      <p:ext uri="{BB962C8B-B14F-4D97-AF65-F5344CB8AC3E}">
+        <p14:creationId xmlns:p14="http://schemas.microsoft.com/office/powerpoint/2010/main" val="3062877926"/>
+      </p:ext>
+    </p:extLst>
+  </p:cSld>
+  <p:clrMapOvr>
+    <a:masterClrMapping/>
+  </p:clrMapOvr>
+</p:sld>
+</file>
+
+<file path=ppt/slides/slide28.xml><?xml version="1.0" encoding="utf-8"?>
+<p:sld xmlns:a="http://schemas.openxmlformats.org/drawingml/2006/main" xmlns:r="http://schemas.openxmlformats.org/officeDocument/2006/relationships" xmlns:p="http://schemas.openxmlformats.org/presentationml/2006/main">
+  <p:cSld>
+    <p:spTree>
+      <p:nvGrpSpPr>
+        <p:cNvPr id="1" name=""/>
+        <p:cNvGrpSpPr/>
+        <p:nvPr/>
+      </p:nvGrpSpPr>
+      <p:grpSpPr>
+        <a:xfrm>
+          <a:off x="0" y="0"/>
+          <a:ext cx="0" cy="0"/>
+          <a:chOff x="0" y="0"/>
+          <a:chExt cx="0" cy="0"/>
+        </a:xfrm>
+      </p:grpSpPr>
+      <p:sp>
+        <p:nvSpPr>
+          <p:cNvPr id="2" name="Title 1">
+            <a:extLst>
+              <a:ext uri="{FF2B5EF4-FFF2-40B4-BE49-F238E27FC236}">
+                <a16:creationId xmlns:a16="http://schemas.microsoft.com/office/drawing/2014/main" id="{6A6336B7-B83F-4C29-8182-87E44747F297}"/>
+              </a:ext>
+            </a:extLst>
+          </p:cNvPr>
+          <p:cNvSpPr>
+            <a:spLocks noGrp="1"/>
+          </p:cNvSpPr>
+          <p:nvPr>
+            <p:ph type="title"/>
+          </p:nvPr>
+        </p:nvSpPr>
+        <p:spPr/>
+        <p:txBody>
+          <a:bodyPr/>
+          <a:lstStyle/>
+          <a:p>
+            <a:r>
+              <a:rPr lang="en-US" dirty="0"/>
+              <a:t>@</a:t>
+            </a:r>
+            <a:r>
+              <a:rPr lang="en-US" dirty="0" err="1"/>
+              <a:t>GeneratedValue</a:t>
+            </a:r>
+            <a:endParaRPr lang="en-US" dirty="0"/>
+          </a:p>
+        </p:txBody>
+      </p:sp>
+      <p:sp>
+        <p:nvSpPr>
+          <p:cNvPr id="3" name="Content Placeholder 2">
+            <a:extLst>
+              <a:ext uri="{FF2B5EF4-FFF2-40B4-BE49-F238E27FC236}">
+                <a16:creationId xmlns:a16="http://schemas.microsoft.com/office/drawing/2014/main" id="{186B97D3-758D-499D-B4B7-66E94F30C929}"/>
+              </a:ext>
+            </a:extLst>
+          </p:cNvPr>
+          <p:cNvSpPr>
+            <a:spLocks noGrp="1"/>
+          </p:cNvSpPr>
+          <p:nvPr>
+            <p:ph idx="1"/>
+          </p:nvPr>
+        </p:nvSpPr>
+        <p:spPr/>
+        <p:txBody>
+          <a:bodyPr/>
+          <a:lstStyle/>
+          <a:p>
+            <a:r>
+              <a:rPr lang="en-US" dirty="0"/>
+              <a:t>Used in conjunction with @Id</a:t>
+            </a:r>
+          </a:p>
+          <a:p>
+            <a:r>
+              <a:rPr lang="en-US" dirty="0"/>
+              <a:t>Indicates the database should generate this value. The strategy parameter indicates how to generate the value. Use IDENTITY to create unique, auto-incrementing numbers.</a:t>
+            </a:r>
+          </a:p>
+        </p:txBody>
+      </p:sp>
+    </p:spTree>
+    <p:extLst>
+      <p:ext uri="{BB962C8B-B14F-4D97-AF65-F5344CB8AC3E}">
+        <p14:creationId xmlns:p14="http://schemas.microsoft.com/office/powerpoint/2010/main" val="2809695625"/>
+      </p:ext>
+    </p:extLst>
+  </p:cSld>
+  <p:clrMapOvr>
+    <a:masterClrMapping/>
+  </p:clrMapOvr>
+</p:sld>
+</file>
+
+<file path=ppt/slides/slide29.xml><?xml version="1.0" encoding="utf-8"?>
+<p:sld xmlns:a="http://schemas.openxmlformats.org/drawingml/2006/main" xmlns:r="http://schemas.openxmlformats.org/officeDocument/2006/relationships" xmlns:p="http://schemas.openxmlformats.org/presentationml/2006/main">
+  <p:cSld>
+    <p:spTree>
+      <p:nvGrpSpPr>
+        <p:cNvPr id="1" name=""/>
+        <p:cNvGrpSpPr/>
+        <p:nvPr/>
+      </p:nvGrpSpPr>
+      <p:grpSpPr>
+        <a:xfrm>
+          <a:off x="0" y="0"/>
+          <a:ext cx="0" cy="0"/>
+          <a:chOff x="0" y="0"/>
+          <a:chExt cx="0" cy="0"/>
+        </a:xfrm>
+      </p:grpSpPr>
+      <p:sp>
+        <p:nvSpPr>
+          <p:cNvPr id="2" name="Title 1">
+            <a:extLst>
+              <a:ext uri="{FF2B5EF4-FFF2-40B4-BE49-F238E27FC236}">
+                <a16:creationId xmlns:a16="http://schemas.microsoft.com/office/drawing/2014/main" id="{C5EFC6AA-4FEE-4F75-85B0-EB8ECFF38AF3}"/>
+              </a:ext>
+            </a:extLst>
+          </p:cNvPr>
+          <p:cNvSpPr>
+            <a:spLocks noGrp="1"/>
+          </p:cNvSpPr>
+          <p:nvPr>
+            <p:ph type="title"/>
+          </p:nvPr>
+        </p:nvSpPr>
+        <p:spPr/>
+        <p:txBody>
+          <a:bodyPr/>
+          <a:lstStyle/>
+          <a:p>
+            <a:r>
+              <a:rPr lang="en-US" dirty="0"/>
+              <a:t>@Lob</a:t>
+            </a:r>
+          </a:p>
+        </p:txBody>
+      </p:sp>
+      <p:sp>
+        <p:nvSpPr>
+          <p:cNvPr id="3" name="Content Placeholder 2">
+            <a:extLst>
+              <a:ext uri="{FF2B5EF4-FFF2-40B4-BE49-F238E27FC236}">
+                <a16:creationId xmlns:a16="http://schemas.microsoft.com/office/drawing/2014/main" id="{016256C3-BBF4-4C43-B87F-50B234C7BF24}"/>
+              </a:ext>
+            </a:extLst>
+          </p:cNvPr>
+          <p:cNvSpPr>
+            <a:spLocks noGrp="1"/>
+          </p:cNvSpPr>
+          <p:nvPr>
+            <p:ph idx="1"/>
+          </p:nvPr>
+        </p:nvSpPr>
+        <p:spPr/>
+        <p:txBody>
+          <a:bodyPr/>
+          <a:lstStyle/>
+          <a:p>
+            <a:r>
+              <a:rPr lang="en-US" dirty="0"/>
+              <a:t>Use this annotation on a String to store large chunks of data into large object (LOB)</a:t>
+            </a:r>
+          </a:p>
+        </p:txBody>
+      </p:sp>
+    </p:spTree>
+    <p:extLst>
+      <p:ext uri="{BB962C8B-B14F-4D97-AF65-F5344CB8AC3E}">
+        <p14:creationId xmlns:p14="http://schemas.microsoft.com/office/powerpoint/2010/main" val="4238734019"/>
+      </p:ext>
+    </p:extLst>
+  </p:cSld>
+  <p:clrMapOvr>
+    <a:masterClrMapping/>
+  </p:clrMapOvr>
+</p:sld>
+</file>
+
 <file path=ppt/slides/slide3.xml><?xml version="1.0" encoding="utf-8"?>
 <p:sld xmlns:a="http://schemas.openxmlformats.org/drawingml/2006/main" xmlns:r="http://schemas.openxmlformats.org/officeDocument/2006/relationships" xmlns:p="http://schemas.openxmlformats.org/presentationml/2006/main">
   <p:cSld>
@@ -11469,6 +12116,1877 @@
     <p:extLst>
       <p:ext uri="{BB962C8B-B14F-4D97-AF65-F5344CB8AC3E}">
         <p14:creationId xmlns:p14="http://schemas.microsoft.com/office/powerpoint/2010/main" val="3987405850"/>
+      </p:ext>
+    </p:extLst>
+  </p:cSld>
+  <p:clrMapOvr>
+    <a:masterClrMapping/>
+  </p:clrMapOvr>
+</p:sld>
+</file>
+
+<file path=ppt/slides/slide30.xml><?xml version="1.0" encoding="utf-8"?>
+<p:sld xmlns:a="http://schemas.openxmlformats.org/drawingml/2006/main" xmlns:r="http://schemas.openxmlformats.org/officeDocument/2006/relationships" xmlns:p="http://schemas.openxmlformats.org/presentationml/2006/main">
+  <p:cSld>
+    <p:spTree>
+      <p:nvGrpSpPr>
+        <p:cNvPr id="1" name=""/>
+        <p:cNvGrpSpPr/>
+        <p:nvPr/>
+      </p:nvGrpSpPr>
+      <p:grpSpPr>
+        <a:xfrm>
+          <a:off x="0" y="0"/>
+          <a:ext cx="0" cy="0"/>
+          <a:chOff x="0" y="0"/>
+          <a:chExt cx="0" cy="0"/>
+        </a:xfrm>
+      </p:grpSpPr>
+      <p:sp>
+        <p:nvSpPr>
+          <p:cNvPr id="2" name="Title 1">
+            <a:extLst>
+              <a:ext uri="{FF2B5EF4-FFF2-40B4-BE49-F238E27FC236}">
+                <a16:creationId xmlns:a16="http://schemas.microsoft.com/office/drawing/2014/main" id="{8287995C-8E34-4229-A212-8C39B65AB00D}"/>
+              </a:ext>
+            </a:extLst>
+          </p:cNvPr>
+          <p:cNvSpPr>
+            <a:spLocks noGrp="1"/>
+          </p:cNvSpPr>
+          <p:nvPr>
+            <p:ph type="title"/>
+          </p:nvPr>
+        </p:nvSpPr>
+        <p:spPr/>
+        <p:txBody>
+          <a:bodyPr/>
+          <a:lstStyle/>
+          <a:p>
+            <a:r>
+              <a:rPr lang="en-US" dirty="0"/>
+              <a:t>Relationships</a:t>
+            </a:r>
+          </a:p>
+        </p:txBody>
+      </p:sp>
+      <p:sp>
+        <p:nvSpPr>
+          <p:cNvPr id="3" name="Content Placeholder 2">
+            <a:extLst>
+              <a:ext uri="{FF2B5EF4-FFF2-40B4-BE49-F238E27FC236}">
+                <a16:creationId xmlns:a16="http://schemas.microsoft.com/office/drawing/2014/main" id="{480ED106-8C68-4790-9BB0-B7ADB22A1796}"/>
+              </a:ext>
+            </a:extLst>
+          </p:cNvPr>
+          <p:cNvSpPr>
+            <a:spLocks noGrp="1"/>
+          </p:cNvSpPr>
+          <p:nvPr>
+            <p:ph idx="1"/>
+          </p:nvPr>
+        </p:nvSpPr>
+        <p:spPr/>
+        <p:txBody>
+          <a:bodyPr/>
+          <a:lstStyle/>
+          <a:p>
+            <a:r>
+              <a:rPr lang="en-US" dirty="0"/>
+              <a:t>Describe how classes relate to one another.</a:t>
+            </a:r>
+          </a:p>
+          <a:p>
+            <a:r>
+              <a:rPr lang="en-US" dirty="0"/>
+              <a:t>@</a:t>
+            </a:r>
+            <a:r>
+              <a:rPr lang="en-US" dirty="0" err="1"/>
+              <a:t>OneToMany</a:t>
+            </a:r>
+            <a:r>
+              <a:rPr lang="en-US" dirty="0"/>
+              <a:t>, @</a:t>
+            </a:r>
+            <a:r>
+              <a:rPr lang="en-US" dirty="0" err="1"/>
+              <a:t>ManyToOne</a:t>
+            </a:r>
+            <a:endParaRPr lang="en-US" dirty="0"/>
+          </a:p>
+          <a:p>
+            <a:r>
+              <a:rPr lang="en-US" dirty="0"/>
+              <a:t>@</a:t>
+            </a:r>
+            <a:r>
+              <a:rPr lang="en-US" dirty="0" err="1"/>
+              <a:t>ManyToMany</a:t>
+            </a:r>
+            <a:endParaRPr lang="en-US" dirty="0"/>
+          </a:p>
+        </p:txBody>
+      </p:sp>
+    </p:spTree>
+    <p:extLst>
+      <p:ext uri="{BB962C8B-B14F-4D97-AF65-F5344CB8AC3E}">
+        <p14:creationId xmlns:p14="http://schemas.microsoft.com/office/powerpoint/2010/main" val="8428890"/>
+      </p:ext>
+    </p:extLst>
+  </p:cSld>
+  <p:clrMapOvr>
+    <a:masterClrMapping/>
+  </p:clrMapOvr>
+</p:sld>
+</file>
+
+<file path=ppt/slides/slide31.xml><?xml version="1.0" encoding="utf-8"?>
+<p:sld xmlns:a="http://schemas.openxmlformats.org/drawingml/2006/main" xmlns:r="http://schemas.openxmlformats.org/officeDocument/2006/relationships" xmlns:p="http://schemas.openxmlformats.org/presentationml/2006/main">
+  <p:cSld>
+    <p:spTree>
+      <p:nvGrpSpPr>
+        <p:cNvPr id="1" name=""/>
+        <p:cNvGrpSpPr/>
+        <p:nvPr/>
+      </p:nvGrpSpPr>
+      <p:grpSpPr>
+        <a:xfrm>
+          <a:off x="0" y="0"/>
+          <a:ext cx="0" cy="0"/>
+          <a:chOff x="0" y="0"/>
+          <a:chExt cx="0" cy="0"/>
+        </a:xfrm>
+      </p:grpSpPr>
+      <p:sp>
+        <p:nvSpPr>
+          <p:cNvPr id="2" name="Title 1">
+            <a:extLst>
+              <a:ext uri="{FF2B5EF4-FFF2-40B4-BE49-F238E27FC236}">
+                <a16:creationId xmlns:a16="http://schemas.microsoft.com/office/drawing/2014/main" id="{197D6C45-243F-4BE3-AF1B-37FA90754B74}"/>
+              </a:ext>
+            </a:extLst>
+          </p:cNvPr>
+          <p:cNvSpPr>
+            <a:spLocks noGrp="1"/>
+          </p:cNvSpPr>
+          <p:nvPr>
+            <p:ph type="title"/>
+          </p:nvPr>
+        </p:nvSpPr>
+        <p:spPr/>
+        <p:txBody>
+          <a:bodyPr/>
+          <a:lstStyle/>
+          <a:p>
+            <a:r>
+              <a:rPr lang="en-US" dirty="0"/>
+              <a:t>Controlling JPA </a:t>
+            </a:r>
+            <a:r>
+              <a:rPr lang="en-US" dirty="0" err="1"/>
+              <a:t>Bootstraping</a:t>
+            </a:r>
+            <a:endParaRPr lang="en-US" dirty="0"/>
+          </a:p>
+        </p:txBody>
+      </p:sp>
+      <p:sp>
+        <p:nvSpPr>
+          <p:cNvPr id="3" name="Content Placeholder 2">
+            <a:extLst>
+              <a:ext uri="{FF2B5EF4-FFF2-40B4-BE49-F238E27FC236}">
+                <a16:creationId xmlns:a16="http://schemas.microsoft.com/office/drawing/2014/main" id="{747DAA26-A289-476B-84B6-E99A615A617C}"/>
+              </a:ext>
+            </a:extLst>
+          </p:cNvPr>
+          <p:cNvSpPr>
+            <a:spLocks noGrp="1"/>
+          </p:cNvSpPr>
+          <p:nvPr>
+            <p:ph idx="1"/>
+          </p:nvPr>
+        </p:nvSpPr>
+        <p:spPr>
+          <a:xfrm>
+            <a:off x="838200" y="1825625"/>
+            <a:ext cx="10515600" cy="624967"/>
+          </a:xfrm>
+        </p:spPr>
+        <p:txBody>
+          <a:bodyPr>
+            <a:normAutofit/>
+          </a:bodyPr>
+          <a:lstStyle/>
+          <a:p>
+            <a:r>
+              <a:rPr lang="en-US" dirty="0" err="1"/>
+              <a:t>spring.jpa.hibernate.ddl</a:t>
+            </a:r>
+            <a:r>
+              <a:rPr lang="en-US" dirty="0"/>
+              <a:t>-auto={value}</a:t>
+            </a:r>
+          </a:p>
+          <a:p>
+            <a:pPr marL="0" indent="0">
+              <a:buNone/>
+            </a:pPr>
+            <a:endParaRPr lang="en-US" dirty="0"/>
+          </a:p>
+        </p:txBody>
+      </p:sp>
+      <p:graphicFrame>
+        <p:nvGraphicFramePr>
+          <p:cNvPr id="4" name="Table 4">
+            <a:extLst>
+              <a:ext uri="{FF2B5EF4-FFF2-40B4-BE49-F238E27FC236}">
+                <a16:creationId xmlns:a16="http://schemas.microsoft.com/office/drawing/2014/main" id="{8AFF3707-D9E3-4B81-8256-8A300451EA06}"/>
+              </a:ext>
+            </a:extLst>
+          </p:cNvPr>
+          <p:cNvGraphicFramePr>
+            <a:graphicFrameLocks noGrp="1"/>
+          </p:cNvGraphicFramePr>
+          <p:nvPr>
+            <p:extLst>
+              <p:ext uri="{D42A27DB-BD31-4B8C-83A1-F6EECF244321}">
+                <p14:modId xmlns:p14="http://schemas.microsoft.com/office/powerpoint/2010/main" val="1971254333"/>
+              </p:ext>
+            </p:extLst>
+          </p:nvPr>
+        </p:nvGraphicFramePr>
+        <p:xfrm>
+          <a:off x="838200" y="2780114"/>
+          <a:ext cx="10515600" cy="2225040"/>
+        </p:xfrm>
+        <a:graphic>
+          <a:graphicData uri="http://schemas.openxmlformats.org/drawingml/2006/table">
+            <a:tbl>
+              <a:tblPr firstRow="1">
+                <a:tableStyleId>{5C22544A-7EE6-4342-B048-85BDC9FD1C3A}</a:tableStyleId>
+              </a:tblPr>
+              <a:tblGrid>
+                <a:gridCol w="1929612">
+                  <a:extLst>
+                    <a:ext uri="{9D8B030D-6E8A-4147-A177-3AD203B41FA5}">
+                      <a16:colId xmlns:a16="http://schemas.microsoft.com/office/drawing/2014/main" val="2493094580"/>
+                    </a:ext>
+                  </a:extLst>
+                </a:gridCol>
+                <a:gridCol w="8585988">
+                  <a:extLst>
+                    <a:ext uri="{9D8B030D-6E8A-4147-A177-3AD203B41FA5}">
+                      <a16:colId xmlns:a16="http://schemas.microsoft.com/office/drawing/2014/main" val="821026817"/>
+                    </a:ext>
+                  </a:extLst>
+                </a:gridCol>
+              </a:tblGrid>
+              <a:tr h="370840">
+                <a:tc>
+                  <a:txBody>
+                    <a:bodyPr/>
+                    <a:lstStyle/>
+                    <a:p>
+                      <a:r>
+                        <a:rPr lang="en-US" dirty="0"/>
+                        <a:t>Value</a:t>
+                      </a:r>
+                    </a:p>
+                  </a:txBody>
+                  <a:tcPr/>
+                </a:tc>
+                <a:tc>
+                  <a:txBody>
+                    <a:bodyPr/>
+                    <a:lstStyle/>
+                    <a:p>
+                      <a:r>
+                        <a:rPr lang="en-US" dirty="0"/>
+                        <a:t>Description</a:t>
+                      </a:r>
+                    </a:p>
+                  </a:txBody>
+                  <a:tcPr/>
+                </a:tc>
+                <a:extLst>
+                  <a:ext uri="{0D108BD9-81ED-4DB2-BD59-A6C34878D82A}">
+                    <a16:rowId xmlns:a16="http://schemas.microsoft.com/office/drawing/2014/main" val="675217156"/>
+                  </a:ext>
+                </a:extLst>
+              </a:tr>
+              <a:tr h="370840">
+                <a:tc>
+                  <a:txBody>
+                    <a:bodyPr/>
+                    <a:lstStyle/>
+                    <a:p>
+                      <a:r>
+                        <a:rPr lang="en-US" dirty="0"/>
+                        <a:t>create</a:t>
+                      </a:r>
+                    </a:p>
+                  </a:txBody>
+                  <a:tcPr/>
+                </a:tc>
+                <a:tc>
+                  <a:txBody>
+                    <a:bodyPr/>
+                    <a:lstStyle/>
+                    <a:p>
+                      <a:r>
+                        <a:rPr lang="en-US" dirty="0"/>
+                        <a:t>Create tables on application startup. Does not drop them during shutdown.</a:t>
+                      </a:r>
+                    </a:p>
+                  </a:txBody>
+                  <a:tcPr/>
+                </a:tc>
+                <a:extLst>
+                  <a:ext uri="{0D108BD9-81ED-4DB2-BD59-A6C34878D82A}">
+                    <a16:rowId xmlns:a16="http://schemas.microsoft.com/office/drawing/2014/main" val="1036294153"/>
+                  </a:ext>
+                </a:extLst>
+              </a:tr>
+              <a:tr h="370840">
+                <a:tc>
+                  <a:txBody>
+                    <a:bodyPr/>
+                    <a:lstStyle/>
+                    <a:p>
+                      <a:r>
+                        <a:rPr lang="en-US" dirty="0"/>
+                        <a:t>create-drop</a:t>
+                      </a:r>
+                    </a:p>
+                  </a:txBody>
+                  <a:tcPr/>
+                </a:tc>
+                <a:tc>
+                  <a:txBody>
+                    <a:bodyPr/>
+                    <a:lstStyle/>
+                    <a:p>
+                      <a:r>
+                        <a:rPr lang="en-US" dirty="0"/>
+                        <a:t>Create on startup, drop on shutdown. Similar to using an embedded database.</a:t>
+                      </a:r>
+                    </a:p>
+                  </a:txBody>
+                  <a:tcPr/>
+                </a:tc>
+                <a:extLst>
+                  <a:ext uri="{0D108BD9-81ED-4DB2-BD59-A6C34878D82A}">
+                    <a16:rowId xmlns:a16="http://schemas.microsoft.com/office/drawing/2014/main" val="3695918441"/>
+                  </a:ext>
+                </a:extLst>
+              </a:tr>
+              <a:tr h="370840">
+                <a:tc>
+                  <a:txBody>
+                    <a:bodyPr/>
+                    <a:lstStyle/>
+                    <a:p>
+                      <a:r>
+                        <a:rPr lang="en-US" dirty="0"/>
+                        <a:t>update</a:t>
+                      </a:r>
+                    </a:p>
+                  </a:txBody>
+                  <a:tcPr/>
+                </a:tc>
+                <a:tc>
+                  <a:txBody>
+                    <a:bodyPr/>
+                    <a:lstStyle/>
+                    <a:p>
+                      <a:r>
+                        <a:rPr lang="en-US" dirty="0"/>
+                        <a:t>Update tables in needed.</a:t>
+                      </a:r>
+                    </a:p>
+                  </a:txBody>
+                  <a:tcPr/>
+                </a:tc>
+                <a:extLst>
+                  <a:ext uri="{0D108BD9-81ED-4DB2-BD59-A6C34878D82A}">
+                    <a16:rowId xmlns:a16="http://schemas.microsoft.com/office/drawing/2014/main" val="3408830169"/>
+                  </a:ext>
+                </a:extLst>
+              </a:tr>
+              <a:tr h="370840">
+                <a:tc>
+                  <a:txBody>
+                    <a:bodyPr/>
+                    <a:lstStyle/>
+                    <a:p>
+                      <a:r>
+                        <a:rPr lang="en-US" dirty="0"/>
+                        <a:t>validate</a:t>
+                      </a:r>
+                    </a:p>
+                  </a:txBody>
+                  <a:tcPr/>
+                </a:tc>
+                <a:tc>
+                  <a:txBody>
+                    <a:bodyPr/>
+                    <a:lstStyle/>
+                    <a:p>
+                      <a:r>
+                        <a:rPr lang="en-US" dirty="0"/>
+                        <a:t>Validate that tables match your Java classes.</a:t>
+                      </a:r>
+                    </a:p>
+                  </a:txBody>
+                  <a:tcPr/>
+                </a:tc>
+                <a:extLst>
+                  <a:ext uri="{0D108BD9-81ED-4DB2-BD59-A6C34878D82A}">
+                    <a16:rowId xmlns:a16="http://schemas.microsoft.com/office/drawing/2014/main" val="380249396"/>
+                  </a:ext>
+                </a:extLst>
+              </a:tr>
+              <a:tr h="370840">
+                <a:tc>
+                  <a:txBody>
+                    <a:bodyPr/>
+                    <a:lstStyle/>
+                    <a:p>
+                      <a:r>
+                        <a:rPr lang="en-US" dirty="0"/>
+                        <a:t>none</a:t>
+                      </a:r>
+                    </a:p>
+                  </a:txBody>
+                  <a:tcPr/>
+                </a:tc>
+                <a:tc>
+                  <a:txBody>
+                    <a:bodyPr/>
+                    <a:lstStyle/>
+                    <a:p>
+                      <a:r>
+                        <a:rPr lang="en-US" dirty="0"/>
+                        <a:t>Do nothing at all.</a:t>
+                      </a:r>
+                    </a:p>
+                  </a:txBody>
+                  <a:tcPr/>
+                </a:tc>
+                <a:extLst>
+                  <a:ext uri="{0D108BD9-81ED-4DB2-BD59-A6C34878D82A}">
+                    <a16:rowId xmlns:a16="http://schemas.microsoft.com/office/drawing/2014/main" val="3479282562"/>
+                  </a:ext>
+                </a:extLst>
+              </a:tr>
+            </a:tbl>
+          </a:graphicData>
+        </a:graphic>
+      </p:graphicFrame>
+    </p:spTree>
+    <p:extLst>
+      <p:ext uri="{BB962C8B-B14F-4D97-AF65-F5344CB8AC3E}">
+        <p14:creationId xmlns:p14="http://schemas.microsoft.com/office/powerpoint/2010/main" val="3989967222"/>
+      </p:ext>
+    </p:extLst>
+  </p:cSld>
+  <p:clrMapOvr>
+    <a:masterClrMapping/>
+  </p:clrMapOvr>
+</p:sld>
+</file>
+
+<file path=ppt/slides/slide32.xml><?xml version="1.0" encoding="utf-8"?>
+<p:sld xmlns:a="http://schemas.openxmlformats.org/drawingml/2006/main" xmlns:r="http://schemas.openxmlformats.org/officeDocument/2006/relationships" xmlns:p="http://schemas.openxmlformats.org/presentationml/2006/main">
+  <p:cSld>
+    <p:spTree>
+      <p:nvGrpSpPr>
+        <p:cNvPr id="1" name=""/>
+        <p:cNvGrpSpPr/>
+        <p:nvPr/>
+      </p:nvGrpSpPr>
+      <p:grpSpPr>
+        <a:xfrm>
+          <a:off x="0" y="0"/>
+          <a:ext cx="0" cy="0"/>
+          <a:chOff x="0" y="0"/>
+          <a:chExt cx="0" cy="0"/>
+        </a:xfrm>
+      </p:grpSpPr>
+      <p:sp>
+        <p:nvSpPr>
+          <p:cNvPr id="2" name="Title 1">
+            <a:extLst>
+              <a:ext uri="{FF2B5EF4-FFF2-40B4-BE49-F238E27FC236}">
+                <a16:creationId xmlns:a16="http://schemas.microsoft.com/office/drawing/2014/main" id="{CD2FAA67-8D4D-49BA-A7A1-CB9F93201637}"/>
+              </a:ext>
+            </a:extLst>
+          </p:cNvPr>
+          <p:cNvSpPr>
+            <a:spLocks noGrp="1"/>
+          </p:cNvSpPr>
+          <p:nvPr>
+            <p:ph type="title"/>
+          </p:nvPr>
+        </p:nvSpPr>
+        <p:spPr/>
+        <p:txBody>
+          <a:bodyPr/>
+          <a:lstStyle/>
+          <a:p>
+            <a:r>
+              <a:rPr lang="en-US" dirty="0"/>
+              <a:t>JPA Repositories</a:t>
+            </a:r>
+          </a:p>
+        </p:txBody>
+      </p:sp>
+      <p:sp>
+        <p:nvSpPr>
+          <p:cNvPr id="3" name="Text Placeholder 2">
+            <a:extLst>
+              <a:ext uri="{FF2B5EF4-FFF2-40B4-BE49-F238E27FC236}">
+                <a16:creationId xmlns:a16="http://schemas.microsoft.com/office/drawing/2014/main" id="{59F5C05F-C1F2-49B3-A6A2-08D8C94366E0}"/>
+              </a:ext>
+            </a:extLst>
+          </p:cNvPr>
+          <p:cNvSpPr>
+            <a:spLocks noGrp="1"/>
+          </p:cNvSpPr>
+          <p:nvPr>
+            <p:ph type="body" idx="1"/>
+          </p:nvPr>
+        </p:nvSpPr>
+        <p:spPr/>
+        <p:txBody>
+          <a:bodyPr/>
+          <a:lstStyle/>
+          <a:p>
+            <a:r>
+              <a:rPr lang="en-US" dirty="0"/>
+              <a:t>Access and manage your data.</a:t>
+            </a:r>
+          </a:p>
+        </p:txBody>
+      </p:sp>
+    </p:spTree>
+    <p:extLst>
+      <p:ext uri="{BB962C8B-B14F-4D97-AF65-F5344CB8AC3E}">
+        <p14:creationId xmlns:p14="http://schemas.microsoft.com/office/powerpoint/2010/main" val="2477433052"/>
+      </p:ext>
+    </p:extLst>
+  </p:cSld>
+  <p:clrMapOvr>
+    <a:masterClrMapping/>
+  </p:clrMapOvr>
+</p:sld>
+</file>
+
+<file path=ppt/slides/slide33.xml><?xml version="1.0" encoding="utf-8"?>
+<p:sld xmlns:a="http://schemas.openxmlformats.org/drawingml/2006/main" xmlns:r="http://schemas.openxmlformats.org/officeDocument/2006/relationships" xmlns:p="http://schemas.openxmlformats.org/presentationml/2006/main">
+  <p:cSld>
+    <p:spTree>
+      <p:nvGrpSpPr>
+        <p:cNvPr id="1" name=""/>
+        <p:cNvGrpSpPr/>
+        <p:nvPr/>
+      </p:nvGrpSpPr>
+      <p:grpSpPr>
+        <a:xfrm>
+          <a:off x="0" y="0"/>
+          <a:ext cx="0" cy="0"/>
+          <a:chOff x="0" y="0"/>
+          <a:chExt cx="0" cy="0"/>
+        </a:xfrm>
+      </p:grpSpPr>
+      <p:sp>
+        <p:nvSpPr>
+          <p:cNvPr id="2" name="Title 1">
+            <a:extLst>
+              <a:ext uri="{FF2B5EF4-FFF2-40B4-BE49-F238E27FC236}">
+                <a16:creationId xmlns:a16="http://schemas.microsoft.com/office/drawing/2014/main" id="{2FBBE480-1A77-4336-9B75-7EA0005223A1}"/>
+              </a:ext>
+            </a:extLst>
+          </p:cNvPr>
+          <p:cNvSpPr>
+            <a:spLocks noGrp="1"/>
+          </p:cNvSpPr>
+          <p:nvPr>
+            <p:ph type="title"/>
+          </p:nvPr>
+        </p:nvSpPr>
+        <p:spPr/>
+        <p:txBody>
+          <a:bodyPr/>
+          <a:lstStyle/>
+          <a:p>
+            <a:r>
+              <a:rPr lang="en-US" dirty="0">
+                <a:hlinkClick r:id="rId2"/>
+              </a:rPr>
+              <a:t>Repositories</a:t>
+            </a:r>
+            <a:endParaRPr lang="en-US" dirty="0"/>
+          </a:p>
+        </p:txBody>
+      </p:sp>
+      <p:sp>
+        <p:nvSpPr>
+          <p:cNvPr id="3" name="Content Placeholder 2">
+            <a:extLst>
+              <a:ext uri="{FF2B5EF4-FFF2-40B4-BE49-F238E27FC236}">
+                <a16:creationId xmlns:a16="http://schemas.microsoft.com/office/drawing/2014/main" id="{9FBE7846-FA94-469C-A628-A47E77F9D73E}"/>
+              </a:ext>
+            </a:extLst>
+          </p:cNvPr>
+          <p:cNvSpPr>
+            <a:spLocks noGrp="1"/>
+          </p:cNvSpPr>
+          <p:nvPr>
+            <p:ph idx="1"/>
+          </p:nvPr>
+        </p:nvSpPr>
+        <p:spPr/>
+        <p:txBody>
+          <a:bodyPr/>
+          <a:lstStyle/>
+          <a:p>
+            <a:r>
+              <a:rPr lang="en-US" dirty="0"/>
+              <a:t>Manage data</a:t>
+            </a:r>
+          </a:p>
+          <a:p>
+            <a:r>
+              <a:rPr lang="en-US" dirty="0"/>
+              <a:t>Expose basic CRUD operations (Create, Retrieve, Update, Delete)</a:t>
+            </a:r>
+          </a:p>
+          <a:p>
+            <a:r>
+              <a:rPr lang="en-US" dirty="0"/>
+              <a:t>Create search methods using naming conventions</a:t>
+            </a:r>
+          </a:p>
+          <a:p>
+            <a:endParaRPr lang="en-US" dirty="0"/>
+          </a:p>
+        </p:txBody>
+      </p:sp>
+    </p:spTree>
+    <p:extLst>
+      <p:ext uri="{BB962C8B-B14F-4D97-AF65-F5344CB8AC3E}">
+        <p14:creationId xmlns:p14="http://schemas.microsoft.com/office/powerpoint/2010/main" val="664075358"/>
+      </p:ext>
+    </p:extLst>
+  </p:cSld>
+  <p:clrMapOvr>
+    <a:masterClrMapping/>
+  </p:clrMapOvr>
+</p:sld>
+</file>
+
+<file path=ppt/slides/slide34.xml><?xml version="1.0" encoding="utf-8"?>
+<p:sld xmlns:a="http://schemas.openxmlformats.org/drawingml/2006/main" xmlns:r="http://schemas.openxmlformats.org/officeDocument/2006/relationships" xmlns:p="http://schemas.openxmlformats.org/presentationml/2006/main">
+  <p:cSld>
+    <p:spTree>
+      <p:nvGrpSpPr>
+        <p:cNvPr id="1" name=""/>
+        <p:cNvGrpSpPr/>
+        <p:nvPr/>
+      </p:nvGrpSpPr>
+      <p:grpSpPr>
+        <a:xfrm>
+          <a:off x="0" y="0"/>
+          <a:ext cx="0" cy="0"/>
+          <a:chOff x="0" y="0"/>
+          <a:chExt cx="0" cy="0"/>
+        </a:xfrm>
+      </p:grpSpPr>
+      <p:sp>
+        <p:nvSpPr>
+          <p:cNvPr id="2" name="Title 1">
+            <a:extLst>
+              <a:ext uri="{FF2B5EF4-FFF2-40B4-BE49-F238E27FC236}">
+                <a16:creationId xmlns:a16="http://schemas.microsoft.com/office/drawing/2014/main" id="{6B7BEA17-A647-48F5-A336-E12101BB8B4C}"/>
+              </a:ext>
+            </a:extLst>
+          </p:cNvPr>
+          <p:cNvSpPr>
+            <a:spLocks noGrp="1"/>
+          </p:cNvSpPr>
+          <p:nvPr>
+            <p:ph type="title"/>
+          </p:nvPr>
+        </p:nvSpPr>
+        <p:spPr/>
+        <p:txBody>
+          <a:bodyPr/>
+          <a:lstStyle/>
+          <a:p>
+            <a:r>
+              <a:rPr lang="en-US" dirty="0">
+                <a:hlinkClick r:id="rId2"/>
+              </a:rPr>
+              <a:t>Search</a:t>
+            </a:r>
+            <a:endParaRPr lang="en-US" dirty="0"/>
+          </a:p>
+        </p:txBody>
+      </p:sp>
+      <p:sp>
+        <p:nvSpPr>
+          <p:cNvPr id="3" name="Content Placeholder 2">
+            <a:extLst>
+              <a:ext uri="{FF2B5EF4-FFF2-40B4-BE49-F238E27FC236}">
+                <a16:creationId xmlns:a16="http://schemas.microsoft.com/office/drawing/2014/main" id="{F6EFA7B4-E8E3-4AB1-9584-FC143849CB91}"/>
+              </a:ext>
+            </a:extLst>
+          </p:cNvPr>
+          <p:cNvSpPr>
+            <a:spLocks noGrp="1"/>
+          </p:cNvSpPr>
+          <p:nvPr>
+            <p:ph idx="1"/>
+          </p:nvPr>
+        </p:nvSpPr>
+        <p:spPr/>
+        <p:txBody>
+          <a:bodyPr/>
+          <a:lstStyle/>
+          <a:p>
+            <a:r>
+              <a:rPr lang="en-US" dirty="0"/>
+              <a:t>You can define queries using method naming convention</a:t>
+            </a:r>
+          </a:p>
+          <a:p>
+            <a:r>
+              <a:rPr lang="en-US" dirty="0"/>
+              <a:t>SQL will automatically be generated for you.</a:t>
+            </a:r>
+          </a:p>
+          <a:p>
+            <a:r>
+              <a:rPr lang="en-US" dirty="0"/>
+              <a:t>Some examples:</a:t>
+            </a:r>
+          </a:p>
+          <a:p>
+            <a:pPr lvl="1"/>
+            <a:r>
+              <a:rPr lang="en-US" dirty="0" err="1"/>
+              <a:t>findByLastnameAndFirstname</a:t>
+            </a:r>
+            <a:endParaRPr lang="en-US" dirty="0"/>
+          </a:p>
+          <a:p>
+            <a:pPr lvl="1"/>
+            <a:r>
+              <a:rPr lang="en-US" dirty="0" err="1"/>
+              <a:t>findByFirstnameLike</a:t>
+            </a:r>
+            <a:endParaRPr lang="en-US" dirty="0"/>
+          </a:p>
+          <a:p>
+            <a:pPr lvl="1"/>
+            <a:r>
+              <a:rPr lang="en-US" dirty="0" err="1"/>
+              <a:t>findByStartDateBetween</a:t>
+            </a:r>
+            <a:endParaRPr lang="en-US" dirty="0"/>
+          </a:p>
+        </p:txBody>
+      </p:sp>
+    </p:spTree>
+    <p:extLst>
+      <p:ext uri="{BB962C8B-B14F-4D97-AF65-F5344CB8AC3E}">
+        <p14:creationId xmlns:p14="http://schemas.microsoft.com/office/powerpoint/2010/main" val="3310436149"/>
+      </p:ext>
+    </p:extLst>
+  </p:cSld>
+  <p:clrMapOvr>
+    <a:masterClrMapping/>
+  </p:clrMapOvr>
+</p:sld>
+</file>
+
+<file path=ppt/slides/slide35.xml><?xml version="1.0" encoding="utf-8"?>
+<p:sld xmlns:a="http://schemas.openxmlformats.org/drawingml/2006/main" xmlns:r="http://schemas.openxmlformats.org/officeDocument/2006/relationships" xmlns:p="http://schemas.openxmlformats.org/presentationml/2006/main">
+  <p:cSld>
+    <p:spTree>
+      <p:nvGrpSpPr>
+        <p:cNvPr id="1" name=""/>
+        <p:cNvGrpSpPr/>
+        <p:nvPr/>
+      </p:nvGrpSpPr>
+      <p:grpSpPr>
+        <a:xfrm>
+          <a:off x="0" y="0"/>
+          <a:ext cx="0" cy="0"/>
+          <a:chOff x="0" y="0"/>
+          <a:chExt cx="0" cy="0"/>
+        </a:xfrm>
+      </p:grpSpPr>
+      <p:sp>
+        <p:nvSpPr>
+          <p:cNvPr id="2" name="Title 1">
+            <a:extLst>
+              <a:ext uri="{FF2B5EF4-FFF2-40B4-BE49-F238E27FC236}">
+                <a16:creationId xmlns:a16="http://schemas.microsoft.com/office/drawing/2014/main" id="{57047C8A-FFA9-4BB6-BF24-263EA0038F0B}"/>
+              </a:ext>
+            </a:extLst>
+          </p:cNvPr>
+          <p:cNvSpPr>
+            <a:spLocks noGrp="1"/>
+          </p:cNvSpPr>
+          <p:nvPr>
+            <p:ph type="title"/>
+          </p:nvPr>
+        </p:nvSpPr>
+        <p:spPr/>
+        <p:txBody>
+          <a:bodyPr/>
+          <a:lstStyle/>
+          <a:p>
+            <a:r>
+              <a:rPr lang="en-US" dirty="0">
+                <a:hlinkClick r:id="rId2"/>
+              </a:rPr>
+              <a:t>Pagination</a:t>
+            </a:r>
+            <a:endParaRPr lang="en-US" dirty="0"/>
+          </a:p>
+        </p:txBody>
+      </p:sp>
+      <p:sp>
+        <p:nvSpPr>
+          <p:cNvPr id="3" name="Content Placeholder 2">
+            <a:extLst>
+              <a:ext uri="{FF2B5EF4-FFF2-40B4-BE49-F238E27FC236}">
+                <a16:creationId xmlns:a16="http://schemas.microsoft.com/office/drawing/2014/main" id="{AD692249-4B88-413B-8710-641CD5E5A018}"/>
+              </a:ext>
+            </a:extLst>
+          </p:cNvPr>
+          <p:cNvSpPr>
+            <a:spLocks noGrp="1"/>
+          </p:cNvSpPr>
+          <p:nvPr>
+            <p:ph idx="1"/>
+          </p:nvPr>
+        </p:nvSpPr>
+        <p:spPr/>
+        <p:txBody>
+          <a:bodyPr/>
+          <a:lstStyle/>
+          <a:p>
+            <a:r>
+              <a:rPr lang="en-US" dirty="0"/>
+              <a:t>Use the Pageable interface as a method argument to capture:</a:t>
+            </a:r>
+          </a:p>
+          <a:p>
+            <a:pPr lvl="1"/>
+            <a:r>
+              <a:rPr lang="en-US" dirty="0"/>
+              <a:t>Page number</a:t>
+            </a:r>
+          </a:p>
+          <a:p>
+            <a:pPr lvl="1"/>
+            <a:r>
+              <a:rPr lang="en-US" dirty="0"/>
+              <a:t>Page size</a:t>
+            </a:r>
+          </a:p>
+          <a:p>
+            <a:pPr lvl="1"/>
+            <a:r>
+              <a:rPr lang="en-US" dirty="0"/>
+              <a:t>Sort</a:t>
+            </a:r>
+          </a:p>
+          <a:p>
+            <a:r>
+              <a:rPr lang="en-US" dirty="0"/>
+              <a:t>Return Page&lt;T&gt; from a Repository to display a subset of a large result set.</a:t>
+            </a:r>
+          </a:p>
+          <a:p>
+            <a:pPr lvl="1"/>
+            <a:r>
+              <a:rPr lang="en-US" dirty="0"/>
+              <a:t>Contains useful information about the number of results.</a:t>
+            </a:r>
+          </a:p>
+        </p:txBody>
+      </p:sp>
+    </p:spTree>
+    <p:extLst>
+      <p:ext uri="{BB962C8B-B14F-4D97-AF65-F5344CB8AC3E}">
+        <p14:creationId xmlns:p14="http://schemas.microsoft.com/office/powerpoint/2010/main" val="3316080631"/>
+      </p:ext>
+    </p:extLst>
+  </p:cSld>
+  <p:clrMapOvr>
+    <a:masterClrMapping/>
+  </p:clrMapOvr>
+</p:sld>
+</file>
+
+<file path=ppt/slides/slide36.xml><?xml version="1.0" encoding="utf-8"?>
+<p:sld xmlns:a="http://schemas.openxmlformats.org/drawingml/2006/main" xmlns:r="http://schemas.openxmlformats.org/officeDocument/2006/relationships" xmlns:p="http://schemas.openxmlformats.org/presentationml/2006/main">
+  <p:cSld>
+    <p:spTree>
+      <p:nvGrpSpPr>
+        <p:cNvPr id="1" name=""/>
+        <p:cNvGrpSpPr/>
+        <p:nvPr/>
+      </p:nvGrpSpPr>
+      <p:grpSpPr>
+        <a:xfrm>
+          <a:off x="0" y="0"/>
+          <a:ext cx="0" cy="0"/>
+          <a:chOff x="0" y="0"/>
+          <a:chExt cx="0" cy="0"/>
+        </a:xfrm>
+      </p:grpSpPr>
+      <p:sp>
+        <p:nvSpPr>
+          <p:cNvPr id="2" name="Title 1">
+            <a:extLst>
+              <a:ext uri="{FF2B5EF4-FFF2-40B4-BE49-F238E27FC236}">
+                <a16:creationId xmlns:a16="http://schemas.microsoft.com/office/drawing/2014/main" id="{6D89C071-0C17-4E35-85C8-F2635C8D6E3E}"/>
+              </a:ext>
+            </a:extLst>
+          </p:cNvPr>
+          <p:cNvSpPr>
+            <a:spLocks noGrp="1"/>
+          </p:cNvSpPr>
+          <p:nvPr>
+            <p:ph type="title"/>
+          </p:nvPr>
+        </p:nvSpPr>
+        <p:spPr/>
+        <p:txBody>
+          <a:bodyPr/>
+          <a:lstStyle/>
+          <a:p>
+            <a:r>
+              <a:rPr lang="en-US" dirty="0">
+                <a:hlinkClick r:id="rId2"/>
+              </a:rPr>
+              <a:t>@Query</a:t>
+            </a:r>
+            <a:endParaRPr lang="en-US" dirty="0"/>
+          </a:p>
+        </p:txBody>
+      </p:sp>
+      <p:sp>
+        <p:nvSpPr>
+          <p:cNvPr id="3" name="Content Placeholder 2">
+            <a:extLst>
+              <a:ext uri="{FF2B5EF4-FFF2-40B4-BE49-F238E27FC236}">
+                <a16:creationId xmlns:a16="http://schemas.microsoft.com/office/drawing/2014/main" id="{45B8E060-93D4-4459-8DB5-4EA77115BA59}"/>
+              </a:ext>
+            </a:extLst>
+          </p:cNvPr>
+          <p:cNvSpPr>
+            <a:spLocks noGrp="1"/>
+          </p:cNvSpPr>
+          <p:nvPr>
+            <p:ph idx="1"/>
+          </p:nvPr>
+        </p:nvSpPr>
+        <p:spPr/>
+        <p:txBody>
+          <a:bodyPr/>
+          <a:lstStyle/>
+          <a:p>
+            <a:r>
+              <a:rPr lang="en-US" dirty="0"/>
+              <a:t>It may be difficult to write a method name that describes your search.</a:t>
+            </a:r>
+          </a:p>
+          <a:p>
+            <a:r>
+              <a:rPr lang="en-US" dirty="0"/>
+              <a:t>For certain cases, writing SQL may still be easier.</a:t>
+            </a:r>
+          </a:p>
+          <a:p>
+            <a:r>
+              <a:rPr lang="en-US" dirty="0"/>
+              <a:t>Supports JPQL, which is portable between databases.</a:t>
+            </a:r>
+          </a:p>
+          <a:p>
+            <a:r>
+              <a:rPr lang="en-US" dirty="0"/>
+              <a:t>Supports native SQL, which may or may not be portable.</a:t>
+            </a:r>
+          </a:p>
+          <a:p>
+            <a:pPr marL="0" indent="0">
+              <a:buNone/>
+            </a:pPr>
+            <a:endParaRPr lang="en-US" dirty="0"/>
+          </a:p>
+        </p:txBody>
+      </p:sp>
+    </p:spTree>
+    <p:extLst>
+      <p:ext uri="{BB962C8B-B14F-4D97-AF65-F5344CB8AC3E}">
+        <p14:creationId xmlns:p14="http://schemas.microsoft.com/office/powerpoint/2010/main" val="2219932468"/>
+      </p:ext>
+    </p:extLst>
+  </p:cSld>
+  <p:clrMapOvr>
+    <a:masterClrMapping/>
+  </p:clrMapOvr>
+</p:sld>
+</file>
+
+<file path=ppt/slides/slide37.xml><?xml version="1.0" encoding="utf-8"?>
+<p:sld xmlns:a="http://schemas.openxmlformats.org/drawingml/2006/main" xmlns:r="http://schemas.openxmlformats.org/officeDocument/2006/relationships" xmlns:p="http://schemas.openxmlformats.org/presentationml/2006/main">
+  <p:cSld>
+    <p:spTree>
+      <p:nvGrpSpPr>
+        <p:cNvPr id="1" name=""/>
+        <p:cNvGrpSpPr/>
+        <p:nvPr/>
+      </p:nvGrpSpPr>
+      <p:grpSpPr>
+        <a:xfrm>
+          <a:off x="0" y="0"/>
+          <a:ext cx="0" cy="0"/>
+          <a:chOff x="0" y="0"/>
+          <a:chExt cx="0" cy="0"/>
+        </a:xfrm>
+      </p:grpSpPr>
+      <p:sp>
+        <p:nvSpPr>
+          <p:cNvPr id="2" name="Title 1">
+            <a:extLst>
+              <a:ext uri="{FF2B5EF4-FFF2-40B4-BE49-F238E27FC236}">
+                <a16:creationId xmlns:a16="http://schemas.microsoft.com/office/drawing/2014/main" id="{B4038DAB-1015-41F7-9AE8-3BFA64C3658B}"/>
+              </a:ext>
+            </a:extLst>
+          </p:cNvPr>
+          <p:cNvSpPr>
+            <a:spLocks noGrp="1"/>
+          </p:cNvSpPr>
+          <p:nvPr>
+            <p:ph type="title"/>
+          </p:nvPr>
+        </p:nvSpPr>
+        <p:spPr/>
+        <p:txBody>
+          <a:bodyPr/>
+          <a:lstStyle/>
+          <a:p>
+            <a:r>
+              <a:rPr lang="en-US" dirty="0"/>
+              <a:t>Debugging</a:t>
+            </a:r>
+          </a:p>
+        </p:txBody>
+      </p:sp>
+      <p:sp>
+        <p:nvSpPr>
+          <p:cNvPr id="3" name="Content Placeholder 2">
+            <a:extLst>
+              <a:ext uri="{FF2B5EF4-FFF2-40B4-BE49-F238E27FC236}">
+                <a16:creationId xmlns:a16="http://schemas.microsoft.com/office/drawing/2014/main" id="{1F7D4F80-A435-4FAB-8A91-46D9B6717FC8}"/>
+              </a:ext>
+            </a:extLst>
+          </p:cNvPr>
+          <p:cNvSpPr>
+            <a:spLocks noGrp="1"/>
+          </p:cNvSpPr>
+          <p:nvPr>
+            <p:ph idx="1"/>
+          </p:nvPr>
+        </p:nvSpPr>
+        <p:spPr>
+          <a:xfrm>
+            <a:off x="838200" y="1825625"/>
+            <a:ext cx="10515600" cy="954151"/>
+          </a:xfrm>
+        </p:spPr>
+        <p:txBody>
+          <a:bodyPr>
+            <a:normAutofit/>
+          </a:bodyPr>
+          <a:lstStyle/>
+          <a:p>
+            <a:pPr marL="0" indent="0">
+              <a:buNone/>
+            </a:pPr>
+            <a:r>
+              <a:rPr lang="en-US" dirty="0"/>
+              <a:t>Add these to </a:t>
+            </a:r>
+            <a:r>
+              <a:rPr lang="en-US" dirty="0" err="1"/>
+              <a:t>application.properties</a:t>
+            </a:r>
+            <a:r>
+              <a:rPr lang="en-US" dirty="0"/>
+              <a:t>. They can help you solve problems by revealing the SQL statements JPA generates.</a:t>
+            </a:r>
+          </a:p>
+          <a:p>
+            <a:pPr marL="0" indent="0">
+              <a:buNone/>
+            </a:pPr>
+            <a:endParaRPr lang="en-US" dirty="0"/>
+          </a:p>
+        </p:txBody>
+      </p:sp>
+      <p:sp>
+        <p:nvSpPr>
+          <p:cNvPr id="4" name="Rectangle 1">
+            <a:extLst>
+              <a:ext uri="{FF2B5EF4-FFF2-40B4-BE49-F238E27FC236}">
+                <a16:creationId xmlns:a16="http://schemas.microsoft.com/office/drawing/2014/main" id="{2F892171-0FC3-4777-8BF9-F92D01294265}"/>
+              </a:ext>
+            </a:extLst>
+          </p:cNvPr>
+          <p:cNvSpPr>
+            <a:spLocks noChangeArrowheads="1"/>
+          </p:cNvSpPr>
+          <p:nvPr/>
+        </p:nvSpPr>
+        <p:spPr bwMode="auto">
+          <a:xfrm>
+            <a:off x="1882140" y="2917761"/>
+            <a:ext cx="8427720" cy="3108543"/>
+          </a:xfrm>
+          <a:prstGeom prst="rect">
+            <a:avLst/>
+          </a:prstGeom>
+          <a:solidFill>
+            <a:srgbClr val="2B2B2B"/>
+          </a:solidFill>
+          <a:ln>
+            <a:noFill/>
+          </a:ln>
+          <a:effectLst/>
+          <a:extLst>
+            <a:ext uri="{91240B29-F687-4F45-9708-019B960494DF}">
+              <a14:hiddenLine xmlns:a14="http://schemas.microsoft.com/office/drawing/2010/main" w="9525">
+                <a:solidFill>
+                  <a:schemeClr val="tx1"/>
+                </a:solidFill>
+                <a:miter lim="800000"/>
+                <a:headEnd/>
+                <a:tailEnd/>
+              </a14:hiddenLine>
+            </a:ext>
+            <a:ext uri="{AF507438-7753-43E0-B8FC-AC1667EBCBE1}">
+              <a14:hiddenEffects xmlns:a14="http://schemas.microsoft.com/office/drawing/2010/main">
+                <a:effectLst>
+                  <a:outerShdw dist="35921" dir="2700000" algn="ctr" rotWithShape="0">
+                    <a:schemeClr val="bg2"/>
+                  </a:outerShdw>
+                </a:effectLst>
+              </a14:hiddenEffects>
+            </a:ext>
+          </a:extLst>
+        </p:spPr>
+        <p:txBody>
+          <a:bodyPr vert="horz" wrap="square" lIns="91440" tIns="45720" rIns="91440" bIns="45720" numCol="1" anchor="ctr" anchorCtr="0" compatLnSpc="1">
+            <a:prstTxWarp prst="textNoShape">
+              <a:avLst/>
+            </a:prstTxWarp>
+            <a:spAutoFit/>
+          </a:bodyPr>
+          <a:lstStyle/>
+          <a:p>
+            <a:pPr marL="0" marR="0" lvl="0" indent="0" algn="l" defTabSz="914400" rtl="0" eaLnBrk="0" fontAlgn="base" latinLnBrk="0" hangingPunct="0">
+              <a:lnSpc>
+                <a:spcPct val="100000"/>
+              </a:lnSpc>
+              <a:spcBef>
+                <a:spcPct val="0"/>
+              </a:spcBef>
+              <a:spcAft>
+                <a:spcPct val="0"/>
+              </a:spcAft>
+              <a:buClrTx/>
+              <a:buSzTx/>
+              <a:buFontTx/>
+              <a:buNone/>
+              <a:tabLst/>
+            </a:pPr>
+            <a:r>
+              <a:rPr kumimoji="0" lang="en-US" altLang="en-US" sz="1400" b="0" i="0" u="none" strike="noStrike" cap="none" normalizeH="0" baseline="0" dirty="0">
+                <a:ln>
+                  <a:noFill/>
+                </a:ln>
+                <a:solidFill>
+                  <a:srgbClr val="808080"/>
+                </a:solidFill>
+                <a:effectLst/>
+                <a:latin typeface="Consolas" panose="020B0609020204030204" pitchFamily="49" charset="0"/>
+              </a:rPr>
+              <a:t># Generated SQL statements will be logged.</a:t>
+            </a:r>
+            <a:br>
+              <a:rPr kumimoji="0" lang="en-US" altLang="en-US" sz="1400" b="0" i="0" u="none" strike="noStrike" cap="none" normalizeH="0" baseline="0" dirty="0">
+                <a:ln>
+                  <a:noFill/>
+                </a:ln>
+                <a:solidFill>
+                  <a:srgbClr val="808080"/>
+                </a:solidFill>
+                <a:effectLst/>
+                <a:latin typeface="Consolas" panose="020B0609020204030204" pitchFamily="49" charset="0"/>
+              </a:rPr>
+            </a:br>
+            <a:r>
+              <a:rPr kumimoji="0" lang="en-US" altLang="en-US" sz="1400" b="0" i="0" u="none" strike="noStrike" cap="none" normalizeH="0" baseline="0" dirty="0">
+                <a:ln>
+                  <a:noFill/>
+                </a:ln>
+                <a:solidFill>
+                  <a:srgbClr val="808080"/>
+                </a:solidFill>
+                <a:effectLst/>
+                <a:latin typeface="Consolas" panose="020B0609020204030204" pitchFamily="49" charset="0"/>
+              </a:rPr>
+              <a:t># This is a good starting point that won't overwhelm your logs with information.</a:t>
+            </a:r>
+            <a:br>
+              <a:rPr kumimoji="0" lang="en-US" altLang="en-US" sz="1400" b="0" i="0" u="none" strike="noStrike" cap="none" normalizeH="0" baseline="0" dirty="0">
+                <a:ln>
+                  <a:noFill/>
+                </a:ln>
+                <a:solidFill>
+                  <a:srgbClr val="808080"/>
+                </a:solidFill>
+                <a:effectLst/>
+                <a:latin typeface="Consolas" panose="020B0609020204030204" pitchFamily="49" charset="0"/>
+              </a:rPr>
+            </a:br>
+            <a:r>
+              <a:rPr kumimoji="0" lang="en-US" altLang="en-US" sz="1400" b="0" i="0" u="none" strike="noStrike" cap="none" normalizeH="0" baseline="0" dirty="0" err="1">
+                <a:ln>
+                  <a:noFill/>
+                </a:ln>
+                <a:solidFill>
+                  <a:srgbClr val="CC7832"/>
+                </a:solidFill>
+                <a:effectLst/>
+                <a:latin typeface="Consolas" panose="020B0609020204030204" pitchFamily="49" charset="0"/>
+              </a:rPr>
+              <a:t>spring.jpa.show-sql</a:t>
+            </a:r>
+            <a:r>
+              <a:rPr kumimoji="0" lang="en-US" altLang="en-US" sz="1400" b="0" i="0" u="none" strike="noStrike" cap="none" normalizeH="0" baseline="0" dirty="0">
+                <a:ln>
+                  <a:noFill/>
+                </a:ln>
+                <a:solidFill>
+                  <a:srgbClr val="CC7832"/>
+                </a:solidFill>
+                <a:effectLst/>
+                <a:latin typeface="Consolas" panose="020B0609020204030204" pitchFamily="49" charset="0"/>
+              </a:rPr>
+              <a:t> </a:t>
+            </a:r>
+            <a:r>
+              <a:rPr kumimoji="0" lang="en-US" altLang="en-US" sz="1400" b="0" i="0" u="none" strike="noStrike" cap="none" normalizeH="0" baseline="0" dirty="0">
+                <a:ln>
+                  <a:noFill/>
+                </a:ln>
+                <a:solidFill>
+                  <a:srgbClr val="808080"/>
+                </a:solidFill>
+                <a:effectLst/>
+                <a:latin typeface="Consolas" panose="020B0609020204030204" pitchFamily="49" charset="0"/>
+              </a:rPr>
+              <a:t>= </a:t>
+            </a:r>
+            <a:r>
+              <a:rPr kumimoji="0" lang="en-US" altLang="en-US" sz="1400" b="0" i="0" u="none" strike="noStrike" cap="none" normalizeH="0" baseline="0" dirty="0">
+                <a:ln>
+                  <a:noFill/>
+                </a:ln>
+                <a:solidFill>
+                  <a:srgbClr val="6A8759"/>
+                </a:solidFill>
+                <a:effectLst/>
+                <a:latin typeface="Consolas" panose="020B0609020204030204" pitchFamily="49" charset="0"/>
+              </a:rPr>
+              <a:t>true</a:t>
+            </a:r>
+            <a:br>
+              <a:rPr kumimoji="0" lang="en-US" altLang="en-US" sz="1400" b="0" i="0" u="none" strike="noStrike" cap="none" normalizeH="0" baseline="0" dirty="0">
+                <a:ln>
+                  <a:noFill/>
+                </a:ln>
+                <a:solidFill>
+                  <a:srgbClr val="6A8759"/>
+                </a:solidFill>
+                <a:effectLst/>
+                <a:latin typeface="Consolas" panose="020B0609020204030204" pitchFamily="49" charset="0"/>
+              </a:rPr>
+            </a:br>
+            <a:br>
+              <a:rPr kumimoji="0" lang="en-US" altLang="en-US" sz="1400" b="0" i="0" u="none" strike="noStrike" cap="none" normalizeH="0" baseline="0" dirty="0">
+                <a:ln>
+                  <a:noFill/>
+                </a:ln>
+                <a:solidFill>
+                  <a:srgbClr val="6A8759"/>
+                </a:solidFill>
+                <a:effectLst/>
+                <a:latin typeface="Consolas" panose="020B0609020204030204" pitchFamily="49" charset="0"/>
+              </a:rPr>
+            </a:br>
+            <a:r>
+              <a:rPr kumimoji="0" lang="en-US" altLang="en-US" sz="1400" b="0" i="0" u="none" strike="noStrike" cap="none" normalizeH="0" baseline="0" dirty="0">
+                <a:ln>
+                  <a:noFill/>
+                </a:ln>
+                <a:solidFill>
+                  <a:srgbClr val="808080"/>
+                </a:solidFill>
+                <a:effectLst/>
+                <a:latin typeface="Consolas" panose="020B0609020204030204" pitchFamily="49" charset="0"/>
+              </a:rPr>
+              <a:t># This has the same outcome as the property shown above.</a:t>
+            </a:r>
+            <a:br>
+              <a:rPr kumimoji="0" lang="en-US" altLang="en-US" sz="1400" b="0" i="0" u="none" strike="noStrike" cap="none" normalizeH="0" baseline="0" dirty="0">
+                <a:ln>
+                  <a:noFill/>
+                </a:ln>
+                <a:solidFill>
+                  <a:srgbClr val="808080"/>
+                </a:solidFill>
+                <a:effectLst/>
+                <a:latin typeface="Consolas" panose="020B0609020204030204" pitchFamily="49" charset="0"/>
+              </a:rPr>
+            </a:br>
+            <a:r>
+              <a:rPr kumimoji="0" lang="en-US" altLang="en-US" sz="1400" b="0" i="0" u="none" strike="noStrike" cap="none" normalizeH="0" baseline="0" dirty="0" err="1">
+                <a:ln>
+                  <a:noFill/>
+                </a:ln>
+                <a:solidFill>
+                  <a:srgbClr val="CC7832"/>
+                </a:solidFill>
+                <a:effectLst/>
+                <a:latin typeface="Consolas" panose="020B0609020204030204" pitchFamily="49" charset="0"/>
+              </a:rPr>
+              <a:t>logging.level.org.hibernate.SQL</a:t>
+            </a:r>
+            <a:r>
+              <a:rPr kumimoji="0" lang="en-US" altLang="en-US" sz="1400" b="0" i="0" u="none" strike="noStrike" cap="none" normalizeH="0" baseline="0" dirty="0">
+                <a:ln>
+                  <a:noFill/>
+                </a:ln>
+                <a:solidFill>
+                  <a:srgbClr val="CC7832"/>
+                </a:solidFill>
+                <a:effectLst/>
+                <a:latin typeface="Consolas" panose="020B0609020204030204" pitchFamily="49" charset="0"/>
+              </a:rPr>
+              <a:t> </a:t>
+            </a:r>
+            <a:r>
+              <a:rPr kumimoji="0" lang="en-US" altLang="en-US" sz="1400" b="0" i="0" u="none" strike="noStrike" cap="none" normalizeH="0" baseline="0" dirty="0">
+                <a:ln>
+                  <a:noFill/>
+                </a:ln>
+                <a:solidFill>
+                  <a:srgbClr val="808080"/>
+                </a:solidFill>
+                <a:effectLst/>
+                <a:latin typeface="Consolas" panose="020B0609020204030204" pitchFamily="49" charset="0"/>
+              </a:rPr>
+              <a:t>= </a:t>
+            </a:r>
+            <a:r>
+              <a:rPr kumimoji="0" lang="en-US" altLang="en-US" sz="1400" b="0" i="0" u="none" strike="noStrike" cap="none" normalizeH="0" baseline="0" dirty="0">
+                <a:ln>
+                  <a:noFill/>
+                </a:ln>
+                <a:solidFill>
+                  <a:srgbClr val="6A8759"/>
+                </a:solidFill>
+                <a:effectLst/>
+                <a:latin typeface="Consolas" panose="020B0609020204030204" pitchFamily="49" charset="0"/>
+              </a:rPr>
+              <a:t>DEBUG</a:t>
+            </a:r>
+            <a:br>
+              <a:rPr kumimoji="0" lang="en-US" altLang="en-US" sz="1400" b="0" i="0" u="none" strike="noStrike" cap="none" normalizeH="0" baseline="0" dirty="0">
+                <a:ln>
+                  <a:noFill/>
+                </a:ln>
+                <a:solidFill>
+                  <a:srgbClr val="6A8759"/>
+                </a:solidFill>
+                <a:effectLst/>
+                <a:latin typeface="Consolas" panose="020B0609020204030204" pitchFamily="49" charset="0"/>
+              </a:rPr>
+            </a:br>
+            <a:br>
+              <a:rPr kumimoji="0" lang="en-US" altLang="en-US" sz="1400" b="0" i="0" u="none" strike="noStrike" cap="none" normalizeH="0" baseline="0" dirty="0">
+                <a:ln>
+                  <a:noFill/>
+                </a:ln>
+                <a:solidFill>
+                  <a:srgbClr val="6A8759"/>
+                </a:solidFill>
+                <a:effectLst/>
+                <a:latin typeface="Consolas" panose="020B0609020204030204" pitchFamily="49" charset="0"/>
+              </a:rPr>
+            </a:br>
+            <a:r>
+              <a:rPr kumimoji="0" lang="en-US" altLang="en-US" sz="1400" b="0" i="0" u="none" strike="noStrike" cap="none" normalizeH="0" baseline="0" dirty="0">
+                <a:ln>
+                  <a:noFill/>
+                </a:ln>
+                <a:solidFill>
+                  <a:srgbClr val="808080"/>
+                </a:solidFill>
+                <a:effectLst/>
+                <a:latin typeface="Consolas" panose="020B0609020204030204" pitchFamily="49" charset="0"/>
+              </a:rPr>
+              <a:t># This property will log the values being bound to SQL prepared statements</a:t>
+            </a:r>
+            <a:br>
+              <a:rPr kumimoji="0" lang="en-US" altLang="en-US" sz="1400" b="0" i="0" u="none" strike="noStrike" cap="none" normalizeH="0" baseline="0" dirty="0">
+                <a:ln>
+                  <a:noFill/>
+                </a:ln>
+                <a:solidFill>
+                  <a:srgbClr val="808080"/>
+                </a:solidFill>
+                <a:effectLst/>
+                <a:latin typeface="Consolas" panose="020B0609020204030204" pitchFamily="49" charset="0"/>
+              </a:rPr>
+            </a:br>
+            <a:r>
+              <a:rPr kumimoji="0" lang="en-US" altLang="en-US" sz="1400" b="0" i="0" u="none" strike="noStrike" cap="none" normalizeH="0" baseline="0" dirty="0">
+                <a:ln>
+                  <a:noFill/>
+                </a:ln>
+                <a:solidFill>
+                  <a:srgbClr val="808080"/>
+                </a:solidFill>
+                <a:effectLst/>
+                <a:latin typeface="Consolas" panose="020B0609020204030204" pitchFamily="49" charset="0"/>
+              </a:rPr>
+              <a:t># without dumping out an overwhelming amount of information.</a:t>
+            </a:r>
+            <a:br>
+              <a:rPr kumimoji="0" lang="en-US" altLang="en-US" sz="1400" b="0" i="0" u="none" strike="noStrike" cap="none" normalizeH="0" baseline="0" dirty="0">
+                <a:ln>
+                  <a:noFill/>
+                </a:ln>
+                <a:solidFill>
+                  <a:srgbClr val="808080"/>
+                </a:solidFill>
+                <a:effectLst/>
+                <a:latin typeface="Consolas" panose="020B0609020204030204" pitchFamily="49" charset="0"/>
+              </a:rPr>
+            </a:br>
+            <a:r>
+              <a:rPr kumimoji="0" lang="en-US" altLang="en-US" sz="1400" b="0" i="0" u="none" strike="noStrike" cap="none" normalizeH="0" baseline="0" dirty="0" err="1">
+                <a:ln>
+                  <a:noFill/>
+                </a:ln>
+                <a:solidFill>
+                  <a:srgbClr val="CC7832"/>
+                </a:solidFill>
+                <a:effectLst/>
+                <a:latin typeface="Consolas" panose="020B0609020204030204" pitchFamily="49" charset="0"/>
+              </a:rPr>
+              <a:t>logging.level.org.hibernate.type.descriptor.sql.BasicBinder</a:t>
+            </a:r>
+            <a:r>
+              <a:rPr kumimoji="0" lang="en-US" altLang="en-US" sz="1400" b="0" i="0" u="none" strike="noStrike" cap="none" normalizeH="0" baseline="0" dirty="0">
+                <a:ln>
+                  <a:noFill/>
+                </a:ln>
+                <a:solidFill>
+                  <a:srgbClr val="CC7832"/>
+                </a:solidFill>
+                <a:effectLst/>
+                <a:latin typeface="Consolas" panose="020B0609020204030204" pitchFamily="49" charset="0"/>
+              </a:rPr>
+              <a:t> </a:t>
+            </a:r>
+            <a:r>
+              <a:rPr kumimoji="0" lang="en-US" altLang="en-US" sz="1400" b="0" i="0" u="none" strike="noStrike" cap="none" normalizeH="0" baseline="0" dirty="0">
+                <a:ln>
+                  <a:noFill/>
+                </a:ln>
+                <a:solidFill>
+                  <a:srgbClr val="808080"/>
+                </a:solidFill>
+                <a:effectLst/>
+                <a:latin typeface="Consolas" panose="020B0609020204030204" pitchFamily="49" charset="0"/>
+              </a:rPr>
+              <a:t>= </a:t>
+            </a:r>
+            <a:r>
+              <a:rPr kumimoji="0" lang="en-US" altLang="en-US" sz="1400" b="0" i="0" u="none" strike="noStrike" cap="none" normalizeH="0" baseline="0" dirty="0">
+                <a:ln>
+                  <a:noFill/>
+                </a:ln>
+                <a:solidFill>
+                  <a:srgbClr val="6A8759"/>
+                </a:solidFill>
+                <a:effectLst/>
+                <a:latin typeface="Consolas" panose="020B0609020204030204" pitchFamily="49" charset="0"/>
+              </a:rPr>
+              <a:t>TRACE</a:t>
+            </a:r>
+            <a:br>
+              <a:rPr kumimoji="0" lang="en-US" altLang="en-US" sz="1400" b="0" i="0" u="none" strike="noStrike" cap="none" normalizeH="0" baseline="0" dirty="0">
+                <a:ln>
+                  <a:noFill/>
+                </a:ln>
+                <a:solidFill>
+                  <a:srgbClr val="6A8759"/>
+                </a:solidFill>
+                <a:effectLst/>
+                <a:latin typeface="Consolas" panose="020B0609020204030204" pitchFamily="49" charset="0"/>
+              </a:rPr>
+            </a:br>
+            <a:br>
+              <a:rPr kumimoji="0" lang="en-US" altLang="en-US" sz="1400" b="0" i="0" u="none" strike="noStrike" cap="none" normalizeH="0" baseline="0" dirty="0">
+                <a:ln>
+                  <a:noFill/>
+                </a:ln>
+                <a:solidFill>
+                  <a:srgbClr val="6A8759"/>
+                </a:solidFill>
+                <a:effectLst/>
+                <a:latin typeface="Consolas" panose="020B0609020204030204" pitchFamily="49" charset="0"/>
+              </a:rPr>
+            </a:br>
+            <a:r>
+              <a:rPr kumimoji="0" lang="en-US" altLang="en-US" sz="1400" b="0" i="0" u="none" strike="noStrike" cap="none" normalizeH="0" baseline="0" dirty="0">
+                <a:ln>
+                  <a:noFill/>
+                </a:ln>
+                <a:solidFill>
+                  <a:srgbClr val="808080"/>
+                </a:solidFill>
+                <a:effectLst/>
+                <a:latin typeface="Consolas" panose="020B0609020204030204" pitchFamily="49" charset="0"/>
+              </a:rPr>
+              <a:t># This property will reveal even more information about bindings and values.</a:t>
+            </a:r>
+            <a:br>
+              <a:rPr kumimoji="0" lang="en-US" altLang="en-US" sz="1400" b="0" i="0" u="none" strike="noStrike" cap="none" normalizeH="0" baseline="0" dirty="0">
+                <a:ln>
+                  <a:noFill/>
+                </a:ln>
+                <a:solidFill>
+                  <a:srgbClr val="808080"/>
+                </a:solidFill>
+                <a:effectLst/>
+                <a:latin typeface="Consolas" panose="020B0609020204030204" pitchFamily="49" charset="0"/>
+              </a:rPr>
+            </a:br>
+            <a:r>
+              <a:rPr kumimoji="0" lang="en-US" altLang="en-US" sz="1400" b="0" i="0" u="none" strike="noStrike" cap="none" normalizeH="0" baseline="0" dirty="0">
+                <a:ln>
+                  <a:noFill/>
+                </a:ln>
+                <a:solidFill>
+                  <a:srgbClr val="808080"/>
+                </a:solidFill>
+                <a:effectLst/>
+                <a:latin typeface="Consolas" panose="020B0609020204030204" pitchFamily="49" charset="0"/>
+              </a:rPr>
+              <a:t># Expect a large amount of logging in your console.</a:t>
+            </a:r>
+            <a:br>
+              <a:rPr kumimoji="0" lang="en-US" altLang="en-US" sz="1400" b="0" i="0" u="none" strike="noStrike" cap="none" normalizeH="0" baseline="0" dirty="0">
+                <a:ln>
+                  <a:noFill/>
+                </a:ln>
+                <a:solidFill>
+                  <a:srgbClr val="808080"/>
+                </a:solidFill>
+                <a:effectLst/>
+                <a:latin typeface="Consolas" panose="020B0609020204030204" pitchFamily="49" charset="0"/>
+              </a:rPr>
+            </a:br>
+            <a:r>
+              <a:rPr kumimoji="0" lang="en-US" altLang="en-US" sz="1400" b="0" i="0" u="none" strike="noStrike" cap="none" normalizeH="0" baseline="0" dirty="0" err="1">
+                <a:ln>
+                  <a:noFill/>
+                </a:ln>
+                <a:solidFill>
+                  <a:srgbClr val="CC7832"/>
+                </a:solidFill>
+                <a:effectLst/>
+                <a:latin typeface="Consolas" panose="020B0609020204030204" pitchFamily="49" charset="0"/>
+              </a:rPr>
+              <a:t>logging.level.org.hibernate.type</a:t>
+            </a:r>
+            <a:r>
+              <a:rPr kumimoji="0" lang="en-US" altLang="en-US" sz="1400" b="0" i="0" u="none" strike="noStrike" cap="none" normalizeH="0" baseline="0" dirty="0">
+                <a:ln>
+                  <a:noFill/>
+                </a:ln>
+                <a:solidFill>
+                  <a:srgbClr val="CC7832"/>
+                </a:solidFill>
+                <a:effectLst/>
+                <a:latin typeface="Consolas" panose="020B0609020204030204" pitchFamily="49" charset="0"/>
+              </a:rPr>
+              <a:t> </a:t>
+            </a:r>
+            <a:r>
+              <a:rPr kumimoji="0" lang="en-US" altLang="en-US" sz="1400" b="0" i="0" u="none" strike="noStrike" cap="none" normalizeH="0" baseline="0" dirty="0">
+                <a:ln>
+                  <a:noFill/>
+                </a:ln>
+                <a:solidFill>
+                  <a:srgbClr val="808080"/>
+                </a:solidFill>
+                <a:effectLst/>
+                <a:latin typeface="Consolas" panose="020B0609020204030204" pitchFamily="49" charset="0"/>
+              </a:rPr>
+              <a:t>= </a:t>
+            </a:r>
+            <a:r>
+              <a:rPr kumimoji="0" lang="en-US" altLang="en-US" sz="1400" b="0" i="0" u="none" strike="noStrike" cap="none" normalizeH="0" baseline="0" dirty="0">
+                <a:ln>
+                  <a:noFill/>
+                </a:ln>
+                <a:solidFill>
+                  <a:srgbClr val="6A8759"/>
+                </a:solidFill>
+                <a:effectLst/>
+                <a:latin typeface="Consolas" panose="020B0609020204030204" pitchFamily="49" charset="0"/>
+              </a:rPr>
+              <a:t>TRACE</a:t>
+            </a:r>
+            <a:endParaRPr kumimoji="0" lang="en-US" altLang="en-US" sz="1400" b="0" i="0" u="none" strike="noStrike" cap="none" normalizeH="0" baseline="0" dirty="0">
+              <a:ln>
+                <a:noFill/>
+              </a:ln>
+              <a:solidFill>
+                <a:schemeClr val="tx1"/>
+              </a:solidFill>
+              <a:effectLst/>
+              <a:latin typeface="Arial" panose="020B0604020202020204" pitchFamily="34" charset="0"/>
+            </a:endParaRPr>
+          </a:p>
+        </p:txBody>
+      </p:sp>
+    </p:spTree>
+    <p:extLst>
+      <p:ext uri="{BB962C8B-B14F-4D97-AF65-F5344CB8AC3E}">
+        <p14:creationId xmlns:p14="http://schemas.microsoft.com/office/powerpoint/2010/main" val="3208040081"/>
+      </p:ext>
+    </p:extLst>
+  </p:cSld>
+  <p:clrMapOvr>
+    <a:masterClrMapping/>
+  </p:clrMapOvr>
+</p:sld>
+</file>
+
+<file path=ppt/slides/slide38.xml><?xml version="1.0" encoding="utf-8"?>
+<p:sld xmlns:a="http://schemas.openxmlformats.org/drawingml/2006/main" xmlns:r="http://schemas.openxmlformats.org/officeDocument/2006/relationships" xmlns:p="http://schemas.openxmlformats.org/presentationml/2006/main">
+  <p:cSld>
+    <p:spTree>
+      <p:nvGrpSpPr>
+        <p:cNvPr id="1" name=""/>
+        <p:cNvGrpSpPr/>
+        <p:nvPr/>
+      </p:nvGrpSpPr>
+      <p:grpSpPr>
+        <a:xfrm>
+          <a:off x="0" y="0"/>
+          <a:ext cx="0" cy="0"/>
+          <a:chOff x="0" y="0"/>
+          <a:chExt cx="0" cy="0"/>
+        </a:xfrm>
+      </p:grpSpPr>
+      <p:sp>
+        <p:nvSpPr>
+          <p:cNvPr id="2" name="Title 1">
+            <a:extLst>
+              <a:ext uri="{FF2B5EF4-FFF2-40B4-BE49-F238E27FC236}">
+                <a16:creationId xmlns:a16="http://schemas.microsoft.com/office/drawing/2014/main" id="{E8A799C7-EEC4-47E9-89C9-2A547A91193A}"/>
+              </a:ext>
+            </a:extLst>
+          </p:cNvPr>
+          <p:cNvSpPr>
+            <a:spLocks noGrp="1"/>
+          </p:cNvSpPr>
+          <p:nvPr>
+            <p:ph type="title"/>
+          </p:nvPr>
+        </p:nvSpPr>
+        <p:spPr/>
+        <p:txBody>
+          <a:bodyPr/>
+          <a:lstStyle/>
+          <a:p>
+            <a:r>
+              <a:rPr lang="en-US" dirty="0"/>
+              <a:t>JPA Summary</a:t>
+            </a:r>
+          </a:p>
+        </p:txBody>
+      </p:sp>
+      <p:sp>
+        <p:nvSpPr>
+          <p:cNvPr id="3" name="Text Placeholder 2">
+            <a:extLst>
+              <a:ext uri="{FF2B5EF4-FFF2-40B4-BE49-F238E27FC236}">
+                <a16:creationId xmlns:a16="http://schemas.microsoft.com/office/drawing/2014/main" id="{9F1D99F2-641F-4520-8431-94F1A8E43E25}"/>
+              </a:ext>
+            </a:extLst>
+          </p:cNvPr>
+          <p:cNvSpPr>
+            <a:spLocks noGrp="1"/>
+          </p:cNvSpPr>
+          <p:nvPr>
+            <p:ph type="body" idx="1"/>
+          </p:nvPr>
+        </p:nvSpPr>
+        <p:spPr/>
+        <p:txBody>
+          <a:bodyPr/>
+          <a:lstStyle/>
+          <a:p>
+            <a:r>
+              <a:rPr lang="en-US" dirty="0"/>
+              <a:t>Advantages</a:t>
+            </a:r>
+          </a:p>
+        </p:txBody>
+      </p:sp>
+      <p:sp>
+        <p:nvSpPr>
+          <p:cNvPr id="4" name="Content Placeholder 3">
+            <a:extLst>
+              <a:ext uri="{FF2B5EF4-FFF2-40B4-BE49-F238E27FC236}">
+                <a16:creationId xmlns:a16="http://schemas.microsoft.com/office/drawing/2014/main" id="{6F35C6FE-7F73-4529-B352-111ECBC81DDA}"/>
+              </a:ext>
+            </a:extLst>
+          </p:cNvPr>
+          <p:cNvSpPr>
+            <a:spLocks noGrp="1"/>
+          </p:cNvSpPr>
+          <p:nvPr>
+            <p:ph sz="half" idx="2"/>
+          </p:nvPr>
+        </p:nvSpPr>
+        <p:spPr/>
+        <p:txBody>
+          <a:bodyPr/>
+          <a:lstStyle/>
+          <a:p>
+            <a:r>
+              <a:rPr lang="en-US" dirty="0"/>
+              <a:t>Greatly reduces boilerplate.</a:t>
+            </a:r>
+          </a:p>
+          <a:p>
+            <a:r>
+              <a:rPr lang="en-US" dirty="0"/>
+              <a:t>Extensive knowledge of SQL not needed (it still helps greatly, though).</a:t>
+            </a:r>
+          </a:p>
+          <a:p>
+            <a:r>
+              <a:rPr lang="en-US" dirty="0"/>
+              <a:t>Rapid prototyping with classes.</a:t>
+            </a:r>
+          </a:p>
+        </p:txBody>
+      </p:sp>
+      <p:sp>
+        <p:nvSpPr>
+          <p:cNvPr id="5" name="Text Placeholder 4">
+            <a:extLst>
+              <a:ext uri="{FF2B5EF4-FFF2-40B4-BE49-F238E27FC236}">
+                <a16:creationId xmlns:a16="http://schemas.microsoft.com/office/drawing/2014/main" id="{D8E68919-89AD-4F73-935E-775C29D78B41}"/>
+              </a:ext>
+            </a:extLst>
+          </p:cNvPr>
+          <p:cNvSpPr>
+            <a:spLocks noGrp="1"/>
+          </p:cNvSpPr>
+          <p:nvPr>
+            <p:ph type="body" sz="quarter" idx="3"/>
+          </p:nvPr>
+        </p:nvSpPr>
+        <p:spPr/>
+        <p:txBody>
+          <a:bodyPr/>
+          <a:lstStyle/>
+          <a:p>
+            <a:r>
+              <a:rPr lang="en-US" dirty="0"/>
+              <a:t>Disadvantages</a:t>
+            </a:r>
+          </a:p>
+        </p:txBody>
+      </p:sp>
+      <p:sp>
+        <p:nvSpPr>
+          <p:cNvPr id="6" name="Content Placeholder 5">
+            <a:extLst>
+              <a:ext uri="{FF2B5EF4-FFF2-40B4-BE49-F238E27FC236}">
+                <a16:creationId xmlns:a16="http://schemas.microsoft.com/office/drawing/2014/main" id="{0FAA2500-4954-4AFA-91EE-A64403B9C02B}"/>
+              </a:ext>
+            </a:extLst>
+          </p:cNvPr>
+          <p:cNvSpPr>
+            <a:spLocks noGrp="1"/>
+          </p:cNvSpPr>
+          <p:nvPr>
+            <p:ph sz="quarter" idx="4"/>
+          </p:nvPr>
+        </p:nvSpPr>
+        <p:spPr/>
+        <p:txBody>
+          <a:bodyPr/>
+          <a:lstStyle/>
+          <a:p>
+            <a:r>
+              <a:rPr lang="en-US" dirty="0"/>
+              <a:t>Not always obvious what queries will be generated.</a:t>
+            </a:r>
+          </a:p>
+          <a:p>
+            <a:r>
+              <a:rPr lang="en-US" dirty="0"/>
+              <a:t>Sometimes difficult to map Java object models to database tables. Polymorphism can be challenging.</a:t>
+            </a:r>
+          </a:p>
+          <a:p>
+            <a:r>
+              <a:rPr lang="en-US" dirty="0"/>
+              <a:t>Multi-column primary keys can be very difficult to work with.</a:t>
+            </a:r>
+          </a:p>
+        </p:txBody>
+      </p:sp>
+    </p:spTree>
+    <p:extLst>
+      <p:ext uri="{BB962C8B-B14F-4D97-AF65-F5344CB8AC3E}">
+        <p14:creationId xmlns:p14="http://schemas.microsoft.com/office/powerpoint/2010/main" val="3221040131"/>
       </p:ext>
     </p:extLst>
   </p:cSld>

</xml_diff>